<commit_message>
lecture 4 and 5
</commit_message>
<xml_diff>
--- a/Part 4/Lecture 4.pptx
+++ b/Part 4/Lecture 4.pptx
@@ -5,7 +5,7 @@
     <p:sldMasterId id="2147483672" r:id="rId1"/>
   </p:sldMasterIdLst>
   <p:notesMasterIdLst>
-    <p:notesMasterId r:id="rId32"/>
+    <p:notesMasterId r:id="rId23"/>
   </p:notesMasterIdLst>
   <p:sldIdLst>
     <p:sldId id="340" r:id="rId2"/>
@@ -28,16 +28,7 @@
     <p:sldId id="349" r:id="rId19"/>
     <p:sldId id="265" r:id="rId20"/>
     <p:sldId id="305" r:id="rId21"/>
-    <p:sldId id="350" r:id="rId22"/>
-    <p:sldId id="308" r:id="rId23"/>
-    <p:sldId id="351" r:id="rId24"/>
-    <p:sldId id="313" r:id="rId25"/>
-    <p:sldId id="352" r:id="rId26"/>
-    <p:sldId id="353" r:id="rId27"/>
-    <p:sldId id="314" r:id="rId28"/>
-    <p:sldId id="354" r:id="rId29"/>
-    <p:sldId id="355" r:id="rId30"/>
-    <p:sldId id="307" r:id="rId31"/>
+    <p:sldId id="307" r:id="rId22"/>
   </p:sldIdLst>
   <p:sldSz cx="12192000" cy="6858000"/>
   <p:notesSz cx="6858000" cy="9144000"/>
@@ -1240,7 +1231,7 @@
           <a:p>
             <a:fld id="{D50EBD97-50EF-EF40-B6C8-8EEC5922A707}" type="datetimeFigureOut">
               <a:rPr lang="en-US" smtClean="0"/>
-              <a:t>7/30/25</a:t>
+              <a:t>7/31/25</a:t>
             </a:fld>
             <a:endParaRPr lang="en-US"/>
           </a:p>
@@ -1946,7 +1937,7 @@
                 <a:ea typeface="+mn-ea"/>
                 <a:cs typeface="+mn-cs"/>
               </a:rPr>
-              <a:t>), using the quantitative ELISA as a classifier and resulted in an AUC of 1, a sensitivity of 99%, and a specificity of 100%, with a cutoff of 9.36 IU/ml (</a:t>
+              <a:t>), using the quantitative ELISA as a classifier and resulted in an AUC of 1, a sensitivity of 99%, and a specificity of 100%, with a cutoff of 9.36 IU/mL (</a:t>
             </a:r>
             <a:r>
               <a:rPr lang="en-US" sz="1200" kern="1200" dirty="0">
@@ -2309,366 +2300,6 @@
     <p:extLst>
       <p:ext uri="{BB962C8B-B14F-4D97-AF65-F5344CB8AC3E}">
         <p14:creationId xmlns:p14="http://schemas.microsoft.com/office/powerpoint/2010/main" val="1474936325"/>
-      </p:ext>
-    </p:extLst>
-  </p:cSld>
-  <p:clrMapOvr>
-    <a:masterClrMapping/>
-  </p:clrMapOvr>
-</p:notes>
-</file>
-
-<file path=ppt/notesSlides/notesSlide16.xml><?xml version="1.0" encoding="utf-8"?>
-<p:notes xmlns:a="http://schemas.openxmlformats.org/drawingml/2006/main" xmlns:r="http://schemas.openxmlformats.org/officeDocument/2006/relationships" xmlns:p="http://schemas.openxmlformats.org/presentationml/2006/main">
-  <p:cSld>
-    <p:spTree>
-      <p:nvGrpSpPr>
-        <p:cNvPr id="1" name=""/>
-        <p:cNvGrpSpPr/>
-        <p:nvPr/>
-      </p:nvGrpSpPr>
-      <p:grpSpPr>
-        <a:xfrm>
-          <a:off x="0" y="0"/>
-          <a:ext cx="0" cy="0"/>
-          <a:chOff x="0" y="0"/>
-          <a:chExt cx="0" cy="0"/>
-        </a:xfrm>
-      </p:grpSpPr>
-      <p:sp>
-        <p:nvSpPr>
-          <p:cNvPr id="2" name="Slide Image Placeholder 1"/>
-          <p:cNvSpPr>
-            <a:spLocks noGrp="1" noRot="1" noChangeAspect="1"/>
-          </p:cNvSpPr>
-          <p:nvPr>
-            <p:ph type="sldImg"/>
-          </p:nvPr>
-        </p:nvSpPr>
-        <p:spPr/>
-      </p:sp>
-      <p:sp>
-        <p:nvSpPr>
-          <p:cNvPr id="3" name="Notes Placeholder 2"/>
-          <p:cNvSpPr>
-            <a:spLocks noGrp="1"/>
-          </p:cNvSpPr>
-          <p:nvPr>
-            <p:ph type="body" idx="1"/>
-          </p:nvPr>
-        </p:nvSpPr>
-        <p:spPr/>
-        <p:txBody>
-          <a:bodyPr/>
-          <a:lstStyle/>
-          <a:p>
-            <a:endParaRPr lang="en-US" dirty="0"/>
-          </a:p>
-        </p:txBody>
-      </p:sp>
-      <p:sp>
-        <p:nvSpPr>
-          <p:cNvPr id="4" name="Slide Number Placeholder 3"/>
-          <p:cNvSpPr>
-            <a:spLocks noGrp="1"/>
-          </p:cNvSpPr>
-          <p:nvPr>
-            <p:ph type="sldNum" sz="quarter" idx="5"/>
-          </p:nvPr>
-        </p:nvSpPr>
-        <p:spPr/>
-        <p:txBody>
-          <a:bodyPr/>
-          <a:lstStyle/>
-          <a:p>
-            <a:fld id="{996BBC3D-3E8B-F74A-BA84-000B911EA6F4}" type="slidenum">
-              <a:rPr lang="en-US" smtClean="0"/>
-              <a:t>21</a:t>
-            </a:fld>
-            <a:endParaRPr lang="en-US"/>
-          </a:p>
-        </p:txBody>
-      </p:sp>
-    </p:spTree>
-    <p:extLst>
-      <p:ext uri="{BB962C8B-B14F-4D97-AF65-F5344CB8AC3E}">
-        <p14:creationId xmlns:p14="http://schemas.microsoft.com/office/powerpoint/2010/main" val="3587419348"/>
-      </p:ext>
-    </p:extLst>
-  </p:cSld>
-  <p:clrMapOvr>
-    <a:masterClrMapping/>
-  </p:clrMapOvr>
-</p:notes>
-</file>
-
-<file path=ppt/notesSlides/notesSlide17.xml><?xml version="1.0" encoding="utf-8"?>
-<p:notes xmlns:a="http://schemas.openxmlformats.org/drawingml/2006/main" xmlns:r="http://schemas.openxmlformats.org/officeDocument/2006/relationships" xmlns:p="http://schemas.openxmlformats.org/presentationml/2006/main">
-  <p:cSld>
-    <p:spTree>
-      <p:nvGrpSpPr>
-        <p:cNvPr id="1" name=""/>
-        <p:cNvGrpSpPr/>
-        <p:nvPr/>
-      </p:nvGrpSpPr>
-      <p:grpSpPr>
-        <a:xfrm>
-          <a:off x="0" y="0"/>
-          <a:ext cx="0" cy="0"/>
-          <a:chOff x="0" y="0"/>
-          <a:chExt cx="0" cy="0"/>
-        </a:xfrm>
-      </p:grpSpPr>
-      <p:sp>
-        <p:nvSpPr>
-          <p:cNvPr id="2" name="Slide Image Placeholder 1"/>
-          <p:cNvSpPr>
-            <a:spLocks noGrp="1" noRot="1" noChangeAspect="1"/>
-          </p:cNvSpPr>
-          <p:nvPr>
-            <p:ph type="sldImg"/>
-          </p:nvPr>
-        </p:nvSpPr>
-        <p:spPr/>
-      </p:sp>
-      <p:sp>
-        <p:nvSpPr>
-          <p:cNvPr id="3" name="Notes Placeholder 2"/>
-          <p:cNvSpPr>
-            <a:spLocks noGrp="1"/>
-          </p:cNvSpPr>
-          <p:nvPr>
-            <p:ph type="body" idx="1"/>
-          </p:nvPr>
-        </p:nvSpPr>
-        <p:spPr/>
-        <p:txBody>
-          <a:bodyPr/>
-          <a:lstStyle/>
-          <a:p>
-            <a:endParaRPr lang="en-US" dirty="0"/>
-          </a:p>
-        </p:txBody>
-      </p:sp>
-      <p:sp>
-        <p:nvSpPr>
-          <p:cNvPr id="4" name="Slide Number Placeholder 3"/>
-          <p:cNvSpPr>
-            <a:spLocks noGrp="1"/>
-          </p:cNvSpPr>
-          <p:nvPr>
-            <p:ph type="sldNum" sz="quarter" idx="5"/>
-          </p:nvPr>
-        </p:nvSpPr>
-        <p:spPr/>
-        <p:txBody>
-          <a:bodyPr/>
-          <a:lstStyle/>
-          <a:p>
-            <a:fld id="{A7294D4A-3C6D-3543-B453-E3C017326446}" type="slidenum">
-              <a:rPr lang="en-US" smtClean="0"/>
-              <a:t>23</a:t>
-            </a:fld>
-            <a:endParaRPr lang="en-US"/>
-          </a:p>
-        </p:txBody>
-      </p:sp>
-    </p:spTree>
-    <p:extLst>
-      <p:ext uri="{BB962C8B-B14F-4D97-AF65-F5344CB8AC3E}">
-        <p14:creationId xmlns:p14="http://schemas.microsoft.com/office/powerpoint/2010/main" val="3009550890"/>
-      </p:ext>
-    </p:extLst>
-  </p:cSld>
-  <p:clrMapOvr>
-    <a:masterClrMapping/>
-  </p:clrMapOvr>
-</p:notes>
-</file>
-
-<file path=ppt/notesSlides/notesSlide18.xml><?xml version="1.0" encoding="utf-8"?>
-<p:notes xmlns:a="http://schemas.openxmlformats.org/drawingml/2006/main" xmlns:r="http://schemas.openxmlformats.org/officeDocument/2006/relationships" xmlns:p="http://schemas.openxmlformats.org/presentationml/2006/main">
-  <p:cSld>
-    <p:spTree>
-      <p:nvGrpSpPr>
-        <p:cNvPr id="1" name="">
-          <a:extLst>
-            <a:ext uri="{FF2B5EF4-FFF2-40B4-BE49-F238E27FC236}">
-              <a16:creationId xmlns:a16="http://schemas.microsoft.com/office/drawing/2014/main" id="{3DF45B6D-A335-8631-A664-BD7EC21AA887}"/>
-            </a:ext>
-          </a:extLst>
-        </p:cNvPr>
-        <p:cNvGrpSpPr/>
-        <p:nvPr/>
-      </p:nvGrpSpPr>
-      <p:grpSpPr>
-        <a:xfrm>
-          <a:off x="0" y="0"/>
-          <a:ext cx="0" cy="0"/>
-          <a:chOff x="0" y="0"/>
-          <a:chExt cx="0" cy="0"/>
-        </a:xfrm>
-      </p:grpSpPr>
-      <p:sp>
-        <p:nvSpPr>
-          <p:cNvPr id="2" name="Slide Image Placeholder 1">
-            <a:extLst>
-              <a:ext uri="{FF2B5EF4-FFF2-40B4-BE49-F238E27FC236}">
-                <a16:creationId xmlns:a16="http://schemas.microsoft.com/office/drawing/2014/main" id="{0E0ABBB4-802B-3DBF-CC70-44C41EEB62AD}"/>
-              </a:ext>
-            </a:extLst>
-          </p:cNvPr>
-          <p:cNvSpPr>
-            <a:spLocks noGrp="1" noRot="1" noChangeAspect="1"/>
-          </p:cNvSpPr>
-          <p:nvPr>
-            <p:ph type="sldImg"/>
-          </p:nvPr>
-        </p:nvSpPr>
-        <p:spPr/>
-      </p:sp>
-      <p:sp>
-        <p:nvSpPr>
-          <p:cNvPr id="3" name="Notes Placeholder 2">
-            <a:extLst>
-              <a:ext uri="{FF2B5EF4-FFF2-40B4-BE49-F238E27FC236}">
-                <a16:creationId xmlns:a16="http://schemas.microsoft.com/office/drawing/2014/main" id="{58A3C351-5735-7F24-891E-651DD64743AC}"/>
-              </a:ext>
-            </a:extLst>
-          </p:cNvPr>
-          <p:cNvSpPr>
-            <a:spLocks noGrp="1"/>
-          </p:cNvSpPr>
-          <p:nvPr>
-            <p:ph type="body" idx="1"/>
-          </p:nvPr>
-        </p:nvSpPr>
-        <p:spPr/>
-        <p:txBody>
-          <a:bodyPr/>
-          <a:lstStyle/>
-          <a:p>
-            <a:endParaRPr lang="en-US" dirty="0"/>
-          </a:p>
-        </p:txBody>
-      </p:sp>
-      <p:sp>
-        <p:nvSpPr>
-          <p:cNvPr id="4" name="Slide Number Placeholder 3">
-            <a:extLst>
-              <a:ext uri="{FF2B5EF4-FFF2-40B4-BE49-F238E27FC236}">
-                <a16:creationId xmlns:a16="http://schemas.microsoft.com/office/drawing/2014/main" id="{81FDEDB7-CA9F-CB4B-56BE-C6535CD1B40D}"/>
-              </a:ext>
-            </a:extLst>
-          </p:cNvPr>
-          <p:cNvSpPr>
-            <a:spLocks noGrp="1"/>
-          </p:cNvSpPr>
-          <p:nvPr>
-            <p:ph type="sldNum" sz="quarter" idx="5"/>
-          </p:nvPr>
-        </p:nvSpPr>
-        <p:spPr/>
-        <p:txBody>
-          <a:bodyPr/>
-          <a:lstStyle/>
-          <a:p>
-            <a:fld id="{A7294D4A-3C6D-3543-B453-E3C017326446}" type="slidenum">
-              <a:rPr lang="en-US" smtClean="0"/>
-              <a:t>24</a:t>
-            </a:fld>
-            <a:endParaRPr lang="en-US"/>
-          </a:p>
-        </p:txBody>
-      </p:sp>
-    </p:spTree>
-    <p:extLst>
-      <p:ext uri="{BB962C8B-B14F-4D97-AF65-F5344CB8AC3E}">
-        <p14:creationId xmlns:p14="http://schemas.microsoft.com/office/powerpoint/2010/main" val="3981693936"/>
-      </p:ext>
-    </p:extLst>
-  </p:cSld>
-  <p:clrMapOvr>
-    <a:masterClrMapping/>
-  </p:clrMapOvr>
-</p:notes>
-</file>
-
-<file path=ppt/notesSlides/notesSlide19.xml><?xml version="1.0" encoding="utf-8"?>
-<p:notes xmlns:a="http://schemas.openxmlformats.org/drawingml/2006/main" xmlns:r="http://schemas.openxmlformats.org/officeDocument/2006/relationships" xmlns:p="http://schemas.openxmlformats.org/presentationml/2006/main">
-  <p:cSld>
-    <p:spTree>
-      <p:nvGrpSpPr>
-        <p:cNvPr id="1" name=""/>
-        <p:cNvGrpSpPr/>
-        <p:nvPr/>
-      </p:nvGrpSpPr>
-      <p:grpSpPr>
-        <a:xfrm>
-          <a:off x="0" y="0"/>
-          <a:ext cx="0" cy="0"/>
-          <a:chOff x="0" y="0"/>
-          <a:chExt cx="0" cy="0"/>
-        </a:xfrm>
-      </p:grpSpPr>
-      <p:sp>
-        <p:nvSpPr>
-          <p:cNvPr id="2" name="Slide Image Placeholder 1"/>
-          <p:cNvSpPr>
-            <a:spLocks noGrp="1" noRot="1" noChangeAspect="1"/>
-          </p:cNvSpPr>
-          <p:nvPr>
-            <p:ph type="sldImg"/>
-          </p:nvPr>
-        </p:nvSpPr>
-        <p:spPr/>
-      </p:sp>
-      <p:sp>
-        <p:nvSpPr>
-          <p:cNvPr id="3" name="Notes Placeholder 2"/>
-          <p:cNvSpPr>
-            <a:spLocks noGrp="1"/>
-          </p:cNvSpPr>
-          <p:nvPr>
-            <p:ph type="body" idx="1"/>
-          </p:nvPr>
-        </p:nvSpPr>
-        <p:spPr/>
-        <p:txBody>
-          <a:bodyPr/>
-          <a:lstStyle/>
-          <a:p>
-            <a:endParaRPr lang="en-US" dirty="0"/>
-          </a:p>
-        </p:txBody>
-      </p:sp>
-      <p:sp>
-        <p:nvSpPr>
-          <p:cNvPr id="4" name="Slide Number Placeholder 3"/>
-          <p:cNvSpPr>
-            <a:spLocks noGrp="1"/>
-          </p:cNvSpPr>
-          <p:nvPr>
-            <p:ph type="sldNum" sz="quarter" idx="5"/>
-          </p:nvPr>
-        </p:nvSpPr>
-        <p:spPr/>
-        <p:txBody>
-          <a:bodyPr/>
-          <a:lstStyle/>
-          <a:p>
-            <a:fld id="{A7294D4A-3C6D-3543-B453-E3C017326446}" type="slidenum">
-              <a:rPr lang="en-US" smtClean="0"/>
-              <a:t>28</a:t>
-            </a:fld>
-            <a:endParaRPr lang="en-US"/>
-          </a:p>
-        </p:txBody>
-      </p:sp>
-    </p:spTree>
-    <p:extLst>
-      <p:ext uri="{BB962C8B-B14F-4D97-AF65-F5344CB8AC3E}">
-        <p14:creationId xmlns:p14="http://schemas.microsoft.com/office/powerpoint/2010/main" val="2672205143"/>
       </p:ext>
     </p:extLst>
   </p:cSld>
@@ -5243,7 +4874,7 @@
           <a:p>
             <a:r>
               <a:rPr lang="en-US" sz="2400" dirty="0"/>
-              <a:t>Rubella correlate of protection is 9.36 IU/ml (international units per milliliter)</a:t>
+              <a:t>Rubella correlate of protection is 9.36 IU/mL (international units per milliliter)</a:t>
             </a:r>
           </a:p>
           <a:p>
@@ -5255,11 +4886,11 @@
           <a:p>
             <a:r>
               <a:rPr lang="en-US" sz="2400" b="1" dirty="0"/>
-              <a:t>We can convert between MFI and IU/ml using a standard curve: </a:t>
+              <a:t>We can convert between MFI and IU/mL using a standard curve: </a:t>
             </a:r>
             <a:r>
               <a:rPr lang="en-US" sz="2400" dirty="0"/>
-              <a:t>we convert all MFI values to IU/ml, and apply the 9.36 IU/ml cutoff</a:t>
+              <a:t>we convert all MFI values to IU/mL, and apply the 9.36 IU/mL cutoff</a:t>
             </a:r>
           </a:p>
         </p:txBody>
@@ -5817,7 +5448,7 @@
           <a:p>
             <a:r>
               <a:rPr lang="en-US" dirty="0"/>
-              <a:t>Converting MFI values to standardized units (IU/ml) from standard curves </a:t>
+              <a:t>Converting MFI values to standardized units (IU/mL) from standard curves </a:t>
             </a:r>
           </a:p>
         </p:txBody>
@@ -6069,7 +5700,7 @@
                 <a:ea typeface="Aptos" panose="020B0004020202020204" pitchFamily="34" charset="0"/>
                 <a:cs typeface="Times New Roman" panose="02020603050405020304" pitchFamily="18" charset="0"/>
               </a:rPr>
-              <a:t>IU/ml concentrations</a:t>
+              <a:t>IU/mL concentrations</a:t>
             </a:r>
             <a:r>
               <a:rPr lang="en-US" sz="2800" kern="100" dirty="0">
@@ -6088,8 +5719,13 @@
             </a:pPr>
             <a:r>
               <a:rPr lang="en-US" dirty="0"/>
-              <a:t>Then, we can use this model to convert MFI values for the samples of interest to IU/ml.</a:t>
-            </a:r>
+              <a:t>Then, we can use this model to convert MFI values for the samples of interest to IU/</a:t>
+            </a:r>
+            <a:r>
+              <a:rPr lang="en-US" dirty="0" err="1"/>
+              <a:t>mL.</a:t>
+            </a:r>
+            <a:endParaRPr lang="en-US" dirty="0"/>
           </a:p>
           <a:p>
             <a:pPr marL="514350" indent="-514350">
@@ -6098,7 +5734,7 @@
             </a:pPr>
             <a:r>
               <a:rPr lang="en-US" dirty="0"/>
-              <a:t>Lastly, we apply the 9.36 IU/ml correlate of protection cutoff to the samples of interest to determine a binary serostatus for each sample.</a:t>
+              <a:t>Lastly, we apply the 9.36 IU/mL correlate of protection cutoff to the samples of interest to determine a binary serostatus for each sample.</a:t>
             </a:r>
           </a:p>
         </p:txBody>
@@ -6169,7 +5805,7 @@
           <a:p>
             <a:r>
               <a:rPr lang="en-US" sz="2400" dirty="0"/>
-              <a:t>For rubella (the “WRUV” antigen), we can apply the cutoff (based on correlate of protection) of 9.36 IU/ml to determine individual serostatus.</a:t>
+              <a:t>For rubella (the “WRUV” antigen), we can apply the cutoff (based on correlate of protection) of 9.36 IU/mL to determine individual serostatus.</a:t>
             </a:r>
           </a:p>
         </p:txBody>
@@ -6202,7 +5838,7 @@
           <a:p>
             <a:r>
               <a:rPr lang="en-US" dirty="0"/>
-              <a:t>Converting MFI values to standardized units (IU/ml) from standard curves </a:t>
+              <a:t>Converting MFI values to standardized units (IU/mL) from standard curves </a:t>
             </a:r>
           </a:p>
         </p:txBody>
@@ -7645,11 +7281,7 @@
           <a:p>
             <a:r>
               <a:rPr lang="en-US" dirty="0"/>
-              <a:t>Calculating seropositivity </a:t>
-            </a:r>
-            <a:r>
-              <a:rPr lang="en-US" i="1" dirty="0"/>
-              <a:t>or seroprevalence</a:t>
+              <a:t>Calculating seroprevalence</a:t>
             </a:r>
           </a:p>
         </p:txBody>
@@ -7687,7 +7319,7 @@
             </a:pPr>
             <a:r>
               <a:rPr lang="en-US" dirty="0"/>
-              <a:t>For WRUV, with a cutoff of 9.36 IU/ml, we have:</a:t>
+              <a:t>For WRUV, with a cutoff of 9.36 IU/mL, we have:</a:t>
             </a:r>
           </a:p>
           <a:p>
@@ -7710,8 +7342,8 @@
           </a:p>
         </p:txBody>
       </p:sp>
-      <mc:AlternateContent xmlns:mc="http://schemas.openxmlformats.org/markup-compatibility/2006" xmlns:a14="http://schemas.microsoft.com/office/drawing/2010/main">
-        <mc:Choice Requires="a14">
+      <mc:AlternateContent xmlns:mc="http://schemas.openxmlformats.org/markup-compatibility/2006">
+        <mc:Choice xmlns:a14="http://schemas.microsoft.com/office/drawing/2010/main" Requires="a14">
           <p:sp>
             <p:nvSpPr>
               <p:cNvPr id="7" name="TextBox 6">
@@ -7762,7 +7394,7 @@
                           <a:ea typeface="Aptos" panose="020B0004020202020204" pitchFamily="34" charset="0"/>
                           <a:cs typeface="Times New Roman" panose="02020603050405020304" pitchFamily="18" charset="0"/>
                         </a:rPr>
-                        <m:t>𝑆𝑒𝑟𝑜𝑝𝑜𝑠𝑖𝑡𝑖𝑣𝑖𝑡𝑦</m:t>
+                        <m:t>𝑆𝑒𝑟𝑜𝑝𝑟𝑒𝑣𝑎𝑙𝑒𝑛𝑐𝑒</m:t>
                       </m:r>
                       <m:r>
                         <a:rPr lang="en-US" sz="2400" b="0" i="1" kern="100" smtClean="0">
@@ -7963,7 +7595,7 @@
             </p:txBody>
           </p:sp>
         </mc:Choice>
-        <mc:Fallback xmlns="">
+        <mc:Fallback>
           <p:sp>
             <p:nvSpPr>
               <p:cNvPr id="7" name="TextBox 6">
@@ -8139,7 +7771,7 @@
           <a:p>
             <a:r>
               <a:rPr lang="en-US" dirty="0"/>
-              <a:t>Calculating seropositivity – confidence intervals</a:t>
+              <a:t>Calculating seroprevalence – confidence intervals</a:t>
             </a:r>
           </a:p>
         </p:txBody>
@@ -8168,44 +7800,25 @@
         </p:spPr>
         <p:txBody>
           <a:bodyPr>
-            <a:normAutofit fontScale="92500" lnSpcReduction="20000"/>
+            <a:normAutofit/>
           </a:bodyPr>
           <a:lstStyle/>
           <a:p>
             <a:r>
-              <a:rPr lang="en-US" dirty="0"/>
+              <a:rPr lang="en-US" sz="2600" dirty="0"/>
               <a:t>Estimating uncertainty is important for capturing true population seroprevalence; it typically accounts for variance around a mean estimate.</a:t>
             </a:r>
           </a:p>
           <a:p>
             <a:r>
-              <a:rPr lang="en-US" dirty="0"/>
+              <a:rPr lang="en-US" sz="2600" dirty="0"/>
               <a:t>Estimating a 95% confidence interval means that in 95 out of 100 calculations of seroprevalence from the same source population using 1000 individuals, the range will include the true population-level seroprevalence.</a:t>
             </a:r>
           </a:p>
           <a:p>
             <a:r>
-              <a:rPr lang="en-US" dirty="0"/>
+              <a:rPr lang="en-US" sz="2600" dirty="0"/>
               <a:t>This method uses a binomial distribution and accounts for the number of people sampled – luckily, we can use R to easily compute it:</a:t>
-            </a:r>
-          </a:p>
-          <a:p>
-            <a:endParaRPr lang="en-US" dirty="0"/>
-          </a:p>
-          <a:p>
-            <a:endParaRPr lang="en-US" dirty="0"/>
-          </a:p>
-          <a:p>
-            <a:pPr marL="239713" indent="0">
-              <a:buNone/>
-            </a:pPr>
-            <a:r>
-              <a:rPr lang="en-US" dirty="0"/>
-              <a:t>With 767 seropositive individuals and 1000 individuals total, the 95% CI is: </a:t>
-            </a:r>
-            <a:r>
-              <a:rPr lang="en-US" b="1" dirty="0"/>
-              <a:t>74.0% - 79.3%.</a:t>
             </a:r>
           </a:p>
         </p:txBody>
@@ -8232,7 +7845,7 @@
         </p:blipFill>
         <p:spPr>
           <a:xfrm>
-            <a:off x="3643312" y="4624074"/>
+            <a:off x="4080441" y="5376968"/>
             <a:ext cx="4031117" cy="890974"/>
           </a:xfrm>
           <a:prstGeom prst="rect">
@@ -8250,85 +7863,6 @@
   <p:clrMapOvr>
     <a:masterClrMapping/>
   </p:clrMapOvr>
-  <p:timing>
-    <p:tnLst>
-      <p:par>
-        <p:cTn id="1" dur="indefinite" restart="never" nodeType="tmRoot">
-          <p:childTnLst>
-            <p:seq concurrent="1" nextAc="seek">
-              <p:cTn id="2" dur="indefinite" nodeType="mainSeq">
-                <p:childTnLst>
-                  <p:par>
-                    <p:cTn id="3" fill="hold">
-                      <p:stCondLst>
-                        <p:cond delay="indefinite"/>
-                      </p:stCondLst>
-                      <p:childTnLst>
-                        <p:par>
-                          <p:cTn id="4" fill="hold">
-                            <p:stCondLst>
-                              <p:cond delay="0"/>
-                            </p:stCondLst>
-                            <p:childTnLst>
-                              <p:par>
-                                <p:cTn id="5" presetID="1" presetClass="entr" presetSubtype="0" fill="hold" nodeType="clickEffect">
-                                  <p:stCondLst>
-                                    <p:cond delay="0"/>
-                                  </p:stCondLst>
-                                  <p:childTnLst>
-                                    <p:set>
-                                      <p:cBhvr>
-                                        <p:cTn id="6" dur="1" fill="hold">
-                                          <p:stCondLst>
-                                            <p:cond delay="0"/>
-                                          </p:stCondLst>
-                                        </p:cTn>
-                                        <p:tgtEl>
-                                          <p:spTgt spid="3">
-                                            <p:txEl>
-                                              <p:pRg st="5" end="5"/>
-                                            </p:txEl>
-                                          </p:spTgt>
-                                        </p:tgtEl>
-                                        <p:attrNameLst>
-                                          <p:attrName>style.visibility</p:attrName>
-                                        </p:attrNameLst>
-                                      </p:cBhvr>
-                                      <p:to>
-                                        <p:strVal val="visible"/>
-                                      </p:to>
-                                    </p:set>
-                                  </p:childTnLst>
-                                </p:cTn>
-                              </p:par>
-                            </p:childTnLst>
-                          </p:cTn>
-                        </p:par>
-                      </p:childTnLst>
-                    </p:cTn>
-                  </p:par>
-                </p:childTnLst>
-              </p:cTn>
-              <p:prevCondLst>
-                <p:cond evt="onPrev" delay="0">
-                  <p:tgtEl>
-                    <p:sldTgt/>
-                  </p:tgtEl>
-                </p:cond>
-              </p:prevCondLst>
-              <p:nextCondLst>
-                <p:cond evt="onNext" delay="0">
-                  <p:tgtEl>
-                    <p:sldTgt/>
-                  </p:tgtEl>
-                </p:cond>
-              </p:nextCondLst>
-            </p:seq>
-          </p:childTnLst>
-        </p:cTn>
-      </p:par>
-    </p:tnLst>
-  </p:timing>
 </p:sld>
 </file>
 
@@ -8397,12 +7931,8 @@
               <a:buNone/>
             </a:pPr>
             <a:r>
-              <a:rPr lang="en-US" i="1" dirty="0"/>
-              <a:t>Seroprevalence</a:t>
-            </a:r>
-            <a:r>
               <a:rPr lang="en-US" dirty="0"/>
-              <a:t> = 76.7% (95% CI: 74.0%, 79.3%) </a:t>
+              <a:t>Seroprevalence = 76.7% (95% CI: 74.0%, 79.3%) </a:t>
             </a:r>
           </a:p>
           <a:p>
@@ -8438,7 +7968,7 @@
           <a:p>
             <a:r>
               <a:rPr lang="en-US" dirty="0"/>
-              <a:t>Calculating seropositivity – confidence intervals</a:t>
+              <a:t>Calculating seroprevalence – confidence intervals</a:t>
             </a:r>
           </a:p>
         </p:txBody>
@@ -9073,8 +8603,13 @@
             </a:pPr>
             <a:r>
               <a:rPr lang="en-US" b="1" dirty="0"/>
-              <a:t>How would we interpret seroprevalence if there is NOT a correlate of protection?</a:t>
-            </a:r>
+              <a:t>How would we interpret seroprevalence if there is NOT a correlate of protection? </a:t>
+            </a:r>
+            <a:r>
+              <a:rPr lang="en-US" dirty="0"/>
+              <a:t>(see Part 5)</a:t>
+            </a:r>
+            <a:endParaRPr lang="en-US" b="1" dirty="0"/>
           </a:p>
         </p:txBody>
       </p:sp>
@@ -9155,7 +8690,7 @@
         <p:spPr>
           <a:xfrm>
             <a:off x="947121" y="1690688"/>
-            <a:ext cx="7597140" cy="4351338"/>
+            <a:ext cx="10515600" cy="4351338"/>
           </a:xfrm>
         </p:spPr>
         <p:txBody>
@@ -9177,12 +8712,6 @@
             <a:r>
               <a:rPr lang="en-US" dirty="0"/>
               <a:t>Calculating seroprevalence from a cutoff</a:t>
-            </a:r>
-          </a:p>
-          <a:p>
-            <a:r>
-              <a:rPr lang="en-US" dirty="0"/>
-              <a:t>Selecting controls</a:t>
             </a:r>
           </a:p>
         </p:txBody>
@@ -9248,34 +8777,38 @@
             </a:pPr>
             <a:r>
               <a:rPr lang="en-US" b="1" dirty="0"/>
-              <a:t>How would we interpret seroprevalence if there is NOT a correlate of protection?</a:t>
-            </a:r>
-          </a:p>
-          <a:p>
+              <a:t>How would we interpret seroprevalence if there is NOT a correlate of protection? </a:t>
+            </a:r>
             <a:r>
               <a:rPr lang="en-US" dirty="0"/>
-              <a:t>For antigens in general, seroprevalence could indicate:</a:t>
+              <a:t>(see Part 5)</a:t>
+            </a:r>
+          </a:p>
+          <a:p>
+            <a:r>
+              <a:rPr lang="en-US" dirty="0"/>
+              <a:t>For antigens in general, seropositivity could indicate:</a:t>
             </a:r>
           </a:p>
           <a:p>
             <a:pPr lvl="1"/>
             <a:r>
               <a:rPr lang="en-US" dirty="0"/>
-              <a:t>Population ever exposed to pathogen or vaccine</a:t>
+              <a:t>Population who has ever been exposed to pathogen or vaccine</a:t>
             </a:r>
           </a:p>
           <a:p>
             <a:pPr lvl="1"/>
             <a:r>
               <a:rPr lang="en-US" dirty="0"/>
-              <a:t>Population with recent infection</a:t>
+              <a:t>Population who has had recent infection</a:t>
             </a:r>
           </a:p>
           <a:p>
             <a:pPr lvl="1"/>
             <a:r>
               <a:rPr lang="en-US" dirty="0"/>
-              <a:t>Population with symptomatic infection</a:t>
+              <a:t>Population who has had symptomatic infection</a:t>
             </a:r>
           </a:p>
           <a:p>
@@ -9355,7 +8888,7 @@
           <p:cNvPr id="2" name="Title 1">
             <a:extLst>
               <a:ext uri="{FF2B5EF4-FFF2-40B4-BE49-F238E27FC236}">
-                <a16:creationId xmlns:a16="http://schemas.microsoft.com/office/drawing/2014/main" id="{F73C67F2-F3E5-A50F-A7C5-2EF0A34C9F21}"/>
+                <a16:creationId xmlns:a16="http://schemas.microsoft.com/office/drawing/2014/main" id="{210510F7-6FB9-CB6D-166B-B0B1018724BB}"/>
               </a:ext>
             </a:extLst>
           </p:cNvPr>
@@ -9373,7 +8906,7 @@
           <a:p>
             <a:r>
               <a:rPr lang="en-US" dirty="0"/>
-              <a:t>Controls </a:t>
+              <a:t>Conclusions</a:t>
             </a:r>
           </a:p>
         </p:txBody>
@@ -9383,7 +8916,7 @@
           <p:cNvPr id="3" name="Content Placeholder 2">
             <a:extLst>
               <a:ext uri="{FF2B5EF4-FFF2-40B4-BE49-F238E27FC236}">
-                <a16:creationId xmlns:a16="http://schemas.microsoft.com/office/drawing/2014/main" id="{4DAE5214-2F99-3603-C4C1-121D106104AC}"/>
+                <a16:creationId xmlns:a16="http://schemas.microsoft.com/office/drawing/2014/main" id="{39CCD9E5-F605-FC4F-6971-2ED435FBD898}"/>
               </a:ext>
             </a:extLst>
           </p:cNvPr>
@@ -9401,1376 +8934,23 @@
           </a:bodyPr>
           <a:lstStyle/>
           <a:p>
-            <a:pPr marL="342900" marR="0" lvl="0" indent="-342900">
-              <a:lnSpc>
-                <a:spcPct val="115000"/>
-              </a:lnSpc>
-              <a:buFont typeface="Symbol" pitchFamily="2" charset="2"/>
-              <a:buChar char=""/>
-            </a:pPr>
-            <a:r>
-              <a:rPr lang="en-US" kern="100" dirty="0">
-                <a:effectLst/>
-                <a:latin typeface="Aptos" panose="020B0004020202020204" pitchFamily="34" charset="0"/>
-                <a:ea typeface="Aptos" panose="020B0004020202020204" pitchFamily="34" charset="0"/>
-                <a:cs typeface="Times New Roman" panose="02020603050405020304" pitchFamily="18" charset="0"/>
-              </a:rPr>
-              <a:t>If we don’t have a correlate of protection, we can use well-characterized control samples to determine cutoffs for seropositivity.</a:t>
-            </a:r>
-          </a:p>
-          <a:p>
-            <a:pPr marL="800100" lvl="1" indent="-342900">
-              <a:lnSpc>
-                <a:spcPct val="115000"/>
-              </a:lnSpc>
-              <a:buFont typeface="Symbol" pitchFamily="2" charset="2"/>
-              <a:buChar char=""/>
-            </a:pPr>
-            <a:r>
-              <a:rPr lang="en-US" sz="2800" kern="100" dirty="0">
-                <a:effectLst/>
-                <a:latin typeface="Aptos" panose="020B0004020202020204" pitchFamily="34" charset="0"/>
-                <a:ea typeface="Aptos" panose="020B0004020202020204" pitchFamily="34" charset="0"/>
-                <a:cs typeface="Times New Roman" panose="02020603050405020304" pitchFamily="18" charset="0"/>
-              </a:rPr>
-              <a:t>Ideally, we </a:t>
-            </a:r>
-            <a:r>
-              <a:rPr lang="en-US" sz="2800" kern="100" dirty="0">
-                <a:latin typeface="Aptos" panose="020B0004020202020204" pitchFamily="34" charset="0"/>
-                <a:ea typeface="Aptos" panose="020B0004020202020204" pitchFamily="34" charset="0"/>
-                <a:cs typeface="Times New Roman" panose="02020603050405020304" pitchFamily="18" charset="0"/>
-              </a:rPr>
-              <a:t>w</a:t>
-            </a:r>
-            <a:r>
-              <a:rPr lang="en-US" sz="2800" kern="100" dirty="0">
-                <a:effectLst/>
-                <a:latin typeface="Aptos" panose="020B0004020202020204" pitchFamily="34" charset="0"/>
-                <a:ea typeface="Aptos" panose="020B0004020202020204" pitchFamily="34" charset="0"/>
-                <a:cs typeface="Times New Roman" panose="02020603050405020304" pitchFamily="18" charset="0"/>
-              </a:rPr>
-              <a:t>ould have positive and negative controls. </a:t>
-            </a:r>
-          </a:p>
-          <a:p>
-            <a:pPr marL="800100" lvl="1" indent="-342900">
-              <a:lnSpc>
-                <a:spcPct val="115000"/>
-              </a:lnSpc>
-              <a:buFont typeface="Symbol" pitchFamily="2" charset="2"/>
-              <a:buChar char=""/>
-            </a:pPr>
-            <a:r>
-              <a:rPr lang="en-US" sz="2800" kern="100" dirty="0">
-                <a:effectLst/>
-                <a:latin typeface="Aptos" panose="020B0004020202020204" pitchFamily="34" charset="0"/>
-                <a:ea typeface="Aptos" panose="020B0004020202020204" pitchFamily="34" charset="0"/>
-                <a:cs typeface="Times New Roman" panose="02020603050405020304" pitchFamily="18" charset="0"/>
-              </a:rPr>
-              <a:t>Often, we only </a:t>
-            </a:r>
-            <a:r>
-              <a:rPr lang="en-US" sz="2800" kern="100" dirty="0">
-                <a:latin typeface="Aptos" panose="020B0004020202020204" pitchFamily="34" charset="0"/>
-                <a:ea typeface="Aptos" panose="020B0004020202020204" pitchFamily="34" charset="0"/>
-                <a:cs typeface="Times New Roman" panose="02020603050405020304" pitchFamily="18" charset="0"/>
-              </a:rPr>
-              <a:t>have negative controls, and sometimes we don’t have positive or negative controls.</a:t>
-            </a:r>
-          </a:p>
-          <a:p>
-            <a:pPr marL="342900" marR="0" lvl="0" indent="-342900">
-              <a:lnSpc>
-                <a:spcPct val="115000"/>
-              </a:lnSpc>
-              <a:buFont typeface="Symbol" pitchFamily="2" charset="2"/>
-              <a:buChar char=""/>
-            </a:pPr>
-            <a:r>
-              <a:rPr lang="en-US" kern="100" dirty="0">
-                <a:latin typeface="Aptos" panose="020B0004020202020204" pitchFamily="34" charset="0"/>
-                <a:ea typeface="Aptos" panose="020B0004020202020204" pitchFamily="34" charset="0"/>
-                <a:cs typeface="Times New Roman" panose="02020603050405020304" pitchFamily="18" charset="0"/>
-              </a:rPr>
-              <a:t>The controls we use to establish cutoffs can affect our interpretation of seroprevalence.</a:t>
-            </a:r>
-            <a:endParaRPr lang="en-US" kern="100" dirty="0">
-              <a:effectLst/>
-              <a:latin typeface="Aptos" panose="020B0004020202020204" pitchFamily="34" charset="0"/>
-              <a:ea typeface="Aptos" panose="020B0004020202020204" pitchFamily="34" charset="0"/>
-              <a:cs typeface="Times New Roman" panose="02020603050405020304" pitchFamily="18" charset="0"/>
-            </a:endParaRPr>
-          </a:p>
-          <a:p>
-            <a:endParaRPr lang="en-US" dirty="0"/>
+            <a:r>
+              <a:rPr lang="en-US" sz="3000" dirty="0"/>
+              <a:t>You should visualize your data before conducting analysis.</a:t>
+            </a:r>
+          </a:p>
+          <a:p>
+            <a:r>
+              <a:rPr lang="en-US" sz="3000" dirty="0"/>
+              <a:t>It can be useful to classify samples as seropositive and seronegative, and to calculate seroprevalence.</a:t>
+            </a:r>
           </a:p>
         </p:txBody>
       </p:sp>
     </p:spTree>
     <p:extLst>
       <p:ext uri="{BB962C8B-B14F-4D97-AF65-F5344CB8AC3E}">
-        <p14:creationId xmlns:p14="http://schemas.microsoft.com/office/powerpoint/2010/main" val="40204400"/>
-      </p:ext>
-    </p:extLst>
-  </p:cSld>
-  <p:clrMapOvr>
-    <a:masterClrMapping/>
-  </p:clrMapOvr>
-</p:sld>
-</file>
-
-<file path=ppt/slides/slide22.xml><?xml version="1.0" encoding="utf-8"?>
-<p:sld xmlns:a="http://schemas.openxmlformats.org/drawingml/2006/main" xmlns:r="http://schemas.openxmlformats.org/officeDocument/2006/relationships" xmlns:p="http://schemas.openxmlformats.org/presentationml/2006/main">
-  <p:cSld>
-    <p:spTree>
-      <p:nvGrpSpPr>
-        <p:cNvPr id="1" name=""/>
-        <p:cNvGrpSpPr/>
-        <p:nvPr/>
-      </p:nvGrpSpPr>
-      <p:grpSpPr>
-        <a:xfrm>
-          <a:off x="0" y="0"/>
-          <a:ext cx="0" cy="0"/>
-          <a:chOff x="0" y="0"/>
-          <a:chExt cx="0" cy="0"/>
-        </a:xfrm>
-      </p:grpSpPr>
-      <p:sp>
-        <p:nvSpPr>
-          <p:cNvPr id="2" name="Title 1">
-            <a:extLst>
-              <a:ext uri="{FF2B5EF4-FFF2-40B4-BE49-F238E27FC236}">
-                <a16:creationId xmlns:a16="http://schemas.microsoft.com/office/drawing/2014/main" id="{7FC78CD1-12C2-3907-41D4-F0A5A9A15AC7}"/>
-              </a:ext>
-            </a:extLst>
-          </p:cNvPr>
-          <p:cNvSpPr>
-            <a:spLocks noGrp="1"/>
-          </p:cNvSpPr>
-          <p:nvPr>
-            <p:ph type="title"/>
-          </p:nvPr>
-        </p:nvSpPr>
-        <p:spPr/>
-        <p:txBody>
-          <a:bodyPr/>
-          <a:lstStyle/>
-          <a:p>
-            <a:r>
-              <a:rPr lang="en-US" dirty="0"/>
-              <a:t>Non-target antigen controls</a:t>
-            </a:r>
-          </a:p>
-        </p:txBody>
-      </p:sp>
-      <p:sp>
-        <p:nvSpPr>
-          <p:cNvPr id="3" name="Content Placeholder 2">
-            <a:extLst>
-              <a:ext uri="{FF2B5EF4-FFF2-40B4-BE49-F238E27FC236}">
-                <a16:creationId xmlns:a16="http://schemas.microsoft.com/office/drawing/2014/main" id="{7991FF55-39F5-9352-E18D-29E7BB35183C}"/>
-              </a:ext>
-            </a:extLst>
-          </p:cNvPr>
-          <p:cNvSpPr>
-            <a:spLocks noGrp="1"/>
-          </p:cNvSpPr>
-          <p:nvPr>
-            <p:ph idx="1"/>
-          </p:nvPr>
-        </p:nvSpPr>
-        <p:spPr>
-          <a:xfrm>
-            <a:off x="838200" y="1825625"/>
-            <a:ext cx="6793089" cy="4351338"/>
-          </a:xfrm>
-        </p:spPr>
-        <p:txBody>
-          <a:bodyPr/>
-          <a:lstStyle/>
-          <a:p>
-            <a:r>
-              <a:rPr lang="en-US" dirty="0"/>
-              <a:t>We also have controls with non-target antigens (SNAP in our dataset; other common ones are GST and Vero cell).</a:t>
-            </a:r>
-          </a:p>
-          <a:p>
-            <a:r>
-              <a:rPr lang="en-US" dirty="0"/>
-              <a:t>These controls can ensure that the plate ran correctly, whether values are similar between plates, and high values can indicate non-specific binding.</a:t>
-            </a:r>
-          </a:p>
-          <a:p>
-            <a:r>
-              <a:rPr lang="en-US" dirty="0"/>
-              <a:t>The non-target antigen values should ideally not differ between samples with high and low antigen values.</a:t>
-            </a:r>
-          </a:p>
-        </p:txBody>
-      </p:sp>
-      <p:pic>
-        <p:nvPicPr>
-          <p:cNvPr id="5" name="Picture 4">
-            <a:extLst>
-              <a:ext uri="{FF2B5EF4-FFF2-40B4-BE49-F238E27FC236}">
-                <a16:creationId xmlns:a16="http://schemas.microsoft.com/office/drawing/2014/main" id="{21FCA42F-EE7A-708B-4F09-08A201B6CFCA}"/>
-              </a:ext>
-            </a:extLst>
-          </p:cNvPr>
-          <p:cNvPicPr>
-            <a:picLocks noChangeAspect="1"/>
-          </p:cNvPicPr>
-          <p:nvPr/>
-        </p:nvPicPr>
-        <p:blipFill>
-          <a:blip r:embed="rId2"/>
-          <a:stretch>
-            <a:fillRect/>
-          </a:stretch>
-        </p:blipFill>
-        <p:spPr>
-          <a:xfrm>
-            <a:off x="7836383" y="1292949"/>
-            <a:ext cx="3119851" cy="4572000"/>
-          </a:xfrm>
-          <a:prstGeom prst="rect">
-            <a:avLst/>
-          </a:prstGeom>
-        </p:spPr>
-      </p:pic>
-    </p:spTree>
-    <p:extLst>
-      <p:ext uri="{BB962C8B-B14F-4D97-AF65-F5344CB8AC3E}">
-        <p14:creationId xmlns:p14="http://schemas.microsoft.com/office/powerpoint/2010/main" val="2276494847"/>
-      </p:ext>
-    </p:extLst>
-  </p:cSld>
-  <p:clrMapOvr>
-    <a:masterClrMapping/>
-  </p:clrMapOvr>
-</p:sld>
-</file>
-
-<file path=ppt/slides/slide23.xml><?xml version="1.0" encoding="utf-8"?>
-<p:sld xmlns:a="http://schemas.openxmlformats.org/drawingml/2006/main" xmlns:r="http://schemas.openxmlformats.org/officeDocument/2006/relationships" xmlns:p="http://schemas.openxmlformats.org/presentationml/2006/main">
-  <p:cSld>
-    <p:spTree>
-      <p:nvGrpSpPr>
-        <p:cNvPr id="1" name=""/>
-        <p:cNvGrpSpPr/>
-        <p:nvPr/>
-      </p:nvGrpSpPr>
-      <p:grpSpPr>
-        <a:xfrm>
-          <a:off x="0" y="0"/>
-          <a:ext cx="0" cy="0"/>
-          <a:chOff x="0" y="0"/>
-          <a:chExt cx="0" cy="0"/>
-        </a:xfrm>
-      </p:grpSpPr>
-      <p:sp>
-        <p:nvSpPr>
-          <p:cNvPr id="2" name="Title 1">
-            <a:extLst>
-              <a:ext uri="{FF2B5EF4-FFF2-40B4-BE49-F238E27FC236}">
-                <a16:creationId xmlns:a16="http://schemas.microsoft.com/office/drawing/2014/main" id="{A9218A3A-1137-C5FC-BF5F-70B892ADB326}"/>
-              </a:ext>
-            </a:extLst>
-          </p:cNvPr>
-          <p:cNvSpPr>
-            <a:spLocks noGrp="1"/>
-          </p:cNvSpPr>
-          <p:nvPr>
-            <p:ph type="title"/>
-          </p:nvPr>
-        </p:nvSpPr>
-        <p:spPr/>
-        <p:txBody>
-          <a:bodyPr/>
-          <a:lstStyle/>
-          <a:p>
-            <a:r>
-              <a:rPr lang="en-US" dirty="0"/>
-              <a:t>Positive controls </a:t>
-            </a:r>
-          </a:p>
-        </p:txBody>
-      </p:sp>
-      <p:sp>
-        <p:nvSpPr>
-          <p:cNvPr id="3" name="Content Placeholder 2">
-            <a:extLst>
-              <a:ext uri="{FF2B5EF4-FFF2-40B4-BE49-F238E27FC236}">
-                <a16:creationId xmlns:a16="http://schemas.microsoft.com/office/drawing/2014/main" id="{6E4F3BB0-8E18-4F0A-7809-AAA20A88B242}"/>
-              </a:ext>
-            </a:extLst>
-          </p:cNvPr>
-          <p:cNvSpPr>
-            <a:spLocks noGrp="1"/>
-          </p:cNvSpPr>
-          <p:nvPr>
-            <p:ph idx="1"/>
-          </p:nvPr>
-        </p:nvSpPr>
-        <p:spPr>
-          <a:xfrm>
-            <a:off x="838200" y="1533017"/>
-            <a:ext cx="10515600" cy="4351338"/>
-          </a:xfrm>
-        </p:spPr>
-        <p:txBody>
-          <a:bodyPr>
-            <a:noAutofit/>
-          </a:bodyPr>
-          <a:lstStyle/>
-          <a:p>
-            <a:pPr>
-              <a:lnSpc>
-                <a:spcPct val="115000"/>
-              </a:lnSpc>
-            </a:pPr>
-            <a:r>
-              <a:rPr lang="en-US" kern="100" dirty="0">
-                <a:effectLst/>
-                <a:latin typeface="Aptos" panose="020B0004020202020204" pitchFamily="34" charset="0"/>
-                <a:ea typeface="Aptos" panose="020B0004020202020204" pitchFamily="34" charset="0"/>
-                <a:cs typeface="Times New Roman" panose="02020603050405020304" pitchFamily="18" charset="0"/>
-              </a:rPr>
-              <a:t>Often, positive controls are based on antibody responses from people who </a:t>
-            </a:r>
-            <a:r>
-              <a:rPr lang="en-US" kern="100" dirty="0">
-                <a:latin typeface="Aptos" panose="020B0004020202020204" pitchFamily="34" charset="0"/>
-                <a:ea typeface="Aptos" panose="020B0004020202020204" pitchFamily="34" charset="0"/>
-                <a:cs typeface="Times New Roman" panose="02020603050405020304" pitchFamily="18" charset="0"/>
-              </a:rPr>
-              <a:t>are known to have had </a:t>
-            </a:r>
-            <a:r>
-              <a:rPr lang="en-US" kern="100" dirty="0">
-                <a:effectLst/>
-                <a:latin typeface="Aptos" panose="020B0004020202020204" pitchFamily="34" charset="0"/>
-                <a:ea typeface="Aptos" panose="020B0004020202020204" pitchFamily="34" charset="0"/>
-                <a:cs typeface="Times New Roman" panose="02020603050405020304" pitchFamily="18" charset="0"/>
-              </a:rPr>
-              <a:t>symptomatic disease. </a:t>
-            </a:r>
-          </a:p>
-          <a:p>
-            <a:pPr>
-              <a:lnSpc>
-                <a:spcPct val="115000"/>
-              </a:lnSpc>
-            </a:pPr>
-            <a:r>
-              <a:rPr lang="en-US" b="1" kern="100" dirty="0">
-                <a:effectLst/>
-                <a:latin typeface="Aptos" panose="020B0004020202020204" pitchFamily="34" charset="0"/>
-                <a:ea typeface="Aptos" panose="020B0004020202020204" pitchFamily="34" charset="0"/>
-                <a:cs typeface="Times New Roman" panose="02020603050405020304" pitchFamily="18" charset="0"/>
-              </a:rPr>
-              <a:t>How might positive controls differ from positives in samples?</a:t>
-            </a:r>
-          </a:p>
-        </p:txBody>
-      </p:sp>
-    </p:spTree>
-    <p:extLst>
-      <p:ext uri="{BB962C8B-B14F-4D97-AF65-F5344CB8AC3E}">
-        <p14:creationId xmlns:p14="http://schemas.microsoft.com/office/powerpoint/2010/main" val="2856764265"/>
-      </p:ext>
-    </p:extLst>
-  </p:cSld>
-  <p:clrMapOvr>
-    <a:masterClrMapping/>
-  </p:clrMapOvr>
-</p:sld>
-</file>
-
-<file path=ppt/slides/slide24.xml><?xml version="1.0" encoding="utf-8"?>
-<p:sld xmlns:a="http://schemas.openxmlformats.org/drawingml/2006/main" xmlns:r="http://schemas.openxmlformats.org/officeDocument/2006/relationships" xmlns:p="http://schemas.openxmlformats.org/presentationml/2006/main">
-  <p:cSld>
-    <p:spTree>
-      <p:nvGrpSpPr>
-        <p:cNvPr id="1" name="">
-          <a:extLst>
-            <a:ext uri="{FF2B5EF4-FFF2-40B4-BE49-F238E27FC236}">
-              <a16:creationId xmlns:a16="http://schemas.microsoft.com/office/drawing/2014/main" id="{D66CFD13-5E28-17E5-E27B-7C80C08B4D42}"/>
-            </a:ext>
-          </a:extLst>
-        </p:cNvPr>
-        <p:cNvGrpSpPr/>
-        <p:nvPr/>
-      </p:nvGrpSpPr>
-      <p:grpSpPr>
-        <a:xfrm>
-          <a:off x="0" y="0"/>
-          <a:ext cx="0" cy="0"/>
-          <a:chOff x="0" y="0"/>
-          <a:chExt cx="0" cy="0"/>
-        </a:xfrm>
-      </p:grpSpPr>
-      <p:sp>
-        <p:nvSpPr>
-          <p:cNvPr id="2" name="Title 1">
-            <a:extLst>
-              <a:ext uri="{FF2B5EF4-FFF2-40B4-BE49-F238E27FC236}">
-                <a16:creationId xmlns:a16="http://schemas.microsoft.com/office/drawing/2014/main" id="{A4C50C4B-CACB-7D91-7AD3-9EAA81DFC124}"/>
-              </a:ext>
-            </a:extLst>
-          </p:cNvPr>
-          <p:cNvSpPr>
-            <a:spLocks noGrp="1"/>
-          </p:cNvSpPr>
-          <p:nvPr>
-            <p:ph type="title"/>
-          </p:nvPr>
-        </p:nvSpPr>
-        <p:spPr/>
-        <p:txBody>
-          <a:bodyPr/>
-          <a:lstStyle/>
-          <a:p>
-            <a:r>
-              <a:rPr lang="en-US" dirty="0"/>
-              <a:t>Positive controls </a:t>
-            </a:r>
-          </a:p>
-        </p:txBody>
-      </p:sp>
-      <p:sp>
-        <p:nvSpPr>
-          <p:cNvPr id="3" name="Content Placeholder 2">
-            <a:extLst>
-              <a:ext uri="{FF2B5EF4-FFF2-40B4-BE49-F238E27FC236}">
-                <a16:creationId xmlns:a16="http://schemas.microsoft.com/office/drawing/2014/main" id="{14812522-68ED-F54E-A149-754C5AAB7C48}"/>
-              </a:ext>
-            </a:extLst>
-          </p:cNvPr>
-          <p:cNvSpPr>
-            <a:spLocks noGrp="1"/>
-          </p:cNvSpPr>
-          <p:nvPr>
-            <p:ph idx="1"/>
-          </p:nvPr>
-        </p:nvSpPr>
-        <p:spPr>
-          <a:xfrm>
-            <a:off x="838200" y="1533017"/>
-            <a:ext cx="10515600" cy="4351338"/>
-          </a:xfrm>
-        </p:spPr>
-        <p:txBody>
-          <a:bodyPr>
-            <a:noAutofit/>
-          </a:bodyPr>
-          <a:lstStyle/>
-          <a:p>
-            <a:pPr>
-              <a:lnSpc>
-                <a:spcPct val="115000"/>
-              </a:lnSpc>
-            </a:pPr>
-            <a:r>
-              <a:rPr lang="en-US" kern="100" dirty="0">
-                <a:effectLst/>
-                <a:latin typeface="Aptos" panose="020B0004020202020204" pitchFamily="34" charset="0"/>
-                <a:ea typeface="Aptos" panose="020B0004020202020204" pitchFamily="34" charset="0"/>
-                <a:cs typeface="Times New Roman" panose="02020603050405020304" pitchFamily="18" charset="0"/>
-              </a:rPr>
-              <a:t>Often, positive controls are based on antibody responses from people who </a:t>
-            </a:r>
-            <a:r>
-              <a:rPr lang="en-US" kern="100" dirty="0">
-                <a:latin typeface="Aptos" panose="020B0004020202020204" pitchFamily="34" charset="0"/>
-                <a:ea typeface="Aptos" panose="020B0004020202020204" pitchFamily="34" charset="0"/>
-                <a:cs typeface="Times New Roman" panose="02020603050405020304" pitchFamily="18" charset="0"/>
-              </a:rPr>
-              <a:t>are known to have had symptomatic disease. </a:t>
-            </a:r>
-          </a:p>
-          <a:p>
-            <a:pPr>
-              <a:lnSpc>
-                <a:spcPct val="115000"/>
-              </a:lnSpc>
-            </a:pPr>
-            <a:r>
-              <a:rPr lang="en-US" b="1" kern="100" dirty="0">
-                <a:effectLst/>
-                <a:latin typeface="Aptos" panose="020B0004020202020204" pitchFamily="34" charset="0"/>
-                <a:ea typeface="Aptos" panose="020B0004020202020204" pitchFamily="34" charset="0"/>
-                <a:cs typeface="Times New Roman" panose="02020603050405020304" pitchFamily="18" charset="0"/>
-              </a:rPr>
-              <a:t>How might positive controls differ from positives in samples?</a:t>
-            </a:r>
-          </a:p>
-          <a:p>
-            <a:pPr lvl="2">
-              <a:lnSpc>
-                <a:spcPct val="115000"/>
-              </a:lnSpc>
-              <a:buFont typeface="Courier New" panose="02070309020205020404" pitchFamily="49" charset="0"/>
-              <a:buChar char="o"/>
-            </a:pPr>
-            <a:r>
-              <a:rPr lang="en-US" sz="2600" kern="100" dirty="0">
-                <a:latin typeface="Aptos" panose="020B0004020202020204" pitchFamily="34" charset="0"/>
-                <a:ea typeface="Aptos" panose="020B0004020202020204" pitchFamily="34" charset="0"/>
-                <a:cs typeface="Times New Roman" panose="02020603050405020304" pitchFamily="18" charset="0"/>
-              </a:rPr>
-              <a:t>Vaccination vs. natural infection</a:t>
-            </a:r>
-          </a:p>
-          <a:p>
-            <a:pPr lvl="2">
-              <a:lnSpc>
-                <a:spcPct val="115000"/>
-              </a:lnSpc>
-              <a:buFont typeface="Courier New" panose="02070309020205020404" pitchFamily="49" charset="0"/>
-              <a:buChar char="o"/>
-            </a:pPr>
-            <a:r>
-              <a:rPr lang="en-US" sz="2600" kern="100" dirty="0">
-                <a:latin typeface="Aptos" panose="020B0004020202020204" pitchFamily="34" charset="0"/>
-                <a:ea typeface="Aptos" panose="020B0004020202020204" pitchFamily="34" charset="0"/>
-                <a:cs typeface="Times New Roman" panose="02020603050405020304" pitchFamily="18" charset="0"/>
-              </a:rPr>
-              <a:t>Intensity of infection – severe, symptomatic, asymptomatic – (controls may be more likely to have clinical or severe infection)</a:t>
-            </a:r>
-          </a:p>
-          <a:p>
-            <a:pPr lvl="2">
-              <a:lnSpc>
-                <a:spcPct val="115000"/>
-              </a:lnSpc>
-              <a:spcAft>
-                <a:spcPts val="800"/>
-              </a:spcAft>
-              <a:buFont typeface="Courier New" panose="02070309020205020404" pitchFamily="49" charset="0"/>
-              <a:buChar char="o"/>
-            </a:pPr>
-            <a:r>
-              <a:rPr lang="en-US" sz="2600" kern="100" dirty="0">
-                <a:latin typeface="Aptos" panose="020B0004020202020204" pitchFamily="34" charset="0"/>
-                <a:ea typeface="Aptos" panose="020B0004020202020204" pitchFamily="34" charset="0"/>
-                <a:cs typeface="Times New Roman" panose="02020603050405020304" pitchFamily="18" charset="0"/>
-              </a:rPr>
-              <a:t>Timing since infection (controls likely were taken from acute infection phase)</a:t>
-            </a:r>
-          </a:p>
-          <a:p>
-            <a:pPr>
-              <a:lnSpc>
-                <a:spcPct val="115000"/>
-              </a:lnSpc>
-            </a:pPr>
-            <a:endParaRPr lang="en-US" sz="3000" b="1" kern="100" dirty="0">
-              <a:effectLst/>
-              <a:latin typeface="Aptos" panose="020B0004020202020204" pitchFamily="34" charset="0"/>
-              <a:ea typeface="Aptos" panose="020B0004020202020204" pitchFamily="34" charset="0"/>
-              <a:cs typeface="Times New Roman" panose="02020603050405020304" pitchFamily="18" charset="0"/>
-            </a:endParaRPr>
-          </a:p>
-        </p:txBody>
-      </p:sp>
-    </p:spTree>
-    <p:extLst>
-      <p:ext uri="{BB962C8B-B14F-4D97-AF65-F5344CB8AC3E}">
-        <p14:creationId xmlns:p14="http://schemas.microsoft.com/office/powerpoint/2010/main" val="1444229574"/>
-      </p:ext>
-    </p:extLst>
-  </p:cSld>
-  <p:clrMapOvr>
-    <a:masterClrMapping/>
-  </p:clrMapOvr>
-</p:sld>
-</file>
-
-<file path=ppt/slides/slide25.xml><?xml version="1.0" encoding="utf-8"?>
-<p:sld xmlns:a="http://schemas.openxmlformats.org/drawingml/2006/main" xmlns:r="http://schemas.openxmlformats.org/officeDocument/2006/relationships" xmlns:p="http://schemas.openxmlformats.org/presentationml/2006/main">
-  <p:cSld>
-    <p:spTree>
-      <p:nvGrpSpPr>
-        <p:cNvPr id="1" name=""/>
-        <p:cNvGrpSpPr/>
-        <p:nvPr/>
-      </p:nvGrpSpPr>
-      <p:grpSpPr>
-        <a:xfrm>
-          <a:off x="0" y="0"/>
-          <a:ext cx="0" cy="0"/>
-          <a:chOff x="0" y="0"/>
-          <a:chExt cx="0" cy="0"/>
-        </a:xfrm>
-      </p:grpSpPr>
-      <p:sp>
-        <p:nvSpPr>
-          <p:cNvPr id="2" name="Title 1">
-            <a:extLst>
-              <a:ext uri="{FF2B5EF4-FFF2-40B4-BE49-F238E27FC236}">
-                <a16:creationId xmlns:a16="http://schemas.microsoft.com/office/drawing/2014/main" id="{1EFCD11A-21F2-D777-EB16-8AAC4B102A42}"/>
-              </a:ext>
-            </a:extLst>
-          </p:cNvPr>
-          <p:cNvSpPr>
-            <a:spLocks noGrp="1"/>
-          </p:cNvSpPr>
-          <p:nvPr>
-            <p:ph type="title"/>
-          </p:nvPr>
-        </p:nvSpPr>
-        <p:spPr/>
-        <p:txBody>
-          <a:bodyPr/>
-          <a:lstStyle/>
-          <a:p>
-            <a:r>
-              <a:rPr lang="en-US" dirty="0"/>
-              <a:t>Negative controls</a:t>
-            </a:r>
-          </a:p>
-        </p:txBody>
-      </p:sp>
-      <p:sp>
-        <p:nvSpPr>
-          <p:cNvPr id="3" name="Content Placeholder 2">
-            <a:extLst>
-              <a:ext uri="{FF2B5EF4-FFF2-40B4-BE49-F238E27FC236}">
-                <a16:creationId xmlns:a16="http://schemas.microsoft.com/office/drawing/2014/main" id="{68AFC8B9-212A-6332-70B0-1D62491C6249}"/>
-              </a:ext>
-            </a:extLst>
-          </p:cNvPr>
-          <p:cNvSpPr>
-            <a:spLocks noGrp="1"/>
-          </p:cNvSpPr>
-          <p:nvPr>
-            <p:ph idx="1"/>
-          </p:nvPr>
-        </p:nvSpPr>
-        <p:spPr/>
-        <p:txBody>
-          <a:bodyPr>
-            <a:normAutofit/>
-          </a:bodyPr>
-          <a:lstStyle/>
-          <a:p>
-            <a:pPr>
-              <a:lnSpc>
-                <a:spcPct val="115000"/>
-              </a:lnSpc>
-              <a:buFont typeface="Symbol" pitchFamily="2" charset="2"/>
-              <a:buChar char=""/>
-            </a:pPr>
-            <a:r>
-              <a:rPr lang="en-US" b="1" kern="100" dirty="0">
-                <a:effectLst/>
-                <a:latin typeface="Aptos" panose="020B0004020202020204" pitchFamily="34" charset="0"/>
-                <a:ea typeface="Aptos" panose="020B0004020202020204" pitchFamily="34" charset="0"/>
-                <a:cs typeface="Times New Roman" panose="02020603050405020304" pitchFamily="18" charset="0"/>
-              </a:rPr>
-              <a:t>What populations might be best to get negative controls from?</a:t>
-            </a:r>
-          </a:p>
-        </p:txBody>
-      </p:sp>
-    </p:spTree>
-    <p:extLst>
-      <p:ext uri="{BB962C8B-B14F-4D97-AF65-F5344CB8AC3E}">
-        <p14:creationId xmlns:p14="http://schemas.microsoft.com/office/powerpoint/2010/main" val="2594302332"/>
-      </p:ext>
-    </p:extLst>
-  </p:cSld>
-  <p:clrMapOvr>
-    <a:masterClrMapping/>
-  </p:clrMapOvr>
-</p:sld>
-</file>
-
-<file path=ppt/slides/slide26.xml><?xml version="1.0" encoding="utf-8"?>
-<p:sld xmlns:a="http://schemas.openxmlformats.org/drawingml/2006/main" xmlns:r="http://schemas.openxmlformats.org/officeDocument/2006/relationships" xmlns:p="http://schemas.openxmlformats.org/presentationml/2006/main">
-  <p:cSld>
-    <p:spTree>
-      <p:nvGrpSpPr>
-        <p:cNvPr id="1" name="">
-          <a:extLst>
-            <a:ext uri="{FF2B5EF4-FFF2-40B4-BE49-F238E27FC236}">
-              <a16:creationId xmlns:a16="http://schemas.microsoft.com/office/drawing/2014/main" id="{BEDAF7FE-3E55-EEA7-DA08-3B319CD5D2C9}"/>
-            </a:ext>
-          </a:extLst>
-        </p:cNvPr>
-        <p:cNvGrpSpPr/>
-        <p:nvPr/>
-      </p:nvGrpSpPr>
-      <p:grpSpPr>
-        <a:xfrm>
-          <a:off x="0" y="0"/>
-          <a:ext cx="0" cy="0"/>
-          <a:chOff x="0" y="0"/>
-          <a:chExt cx="0" cy="0"/>
-        </a:xfrm>
-      </p:grpSpPr>
-      <p:sp>
-        <p:nvSpPr>
-          <p:cNvPr id="2" name="Title 1">
-            <a:extLst>
-              <a:ext uri="{FF2B5EF4-FFF2-40B4-BE49-F238E27FC236}">
-                <a16:creationId xmlns:a16="http://schemas.microsoft.com/office/drawing/2014/main" id="{19CE1CBF-80F0-35D0-185C-3F4CDBD08724}"/>
-              </a:ext>
-            </a:extLst>
-          </p:cNvPr>
-          <p:cNvSpPr>
-            <a:spLocks noGrp="1"/>
-          </p:cNvSpPr>
-          <p:nvPr>
-            <p:ph type="title"/>
-          </p:nvPr>
-        </p:nvSpPr>
-        <p:spPr/>
-        <p:txBody>
-          <a:bodyPr/>
-          <a:lstStyle/>
-          <a:p>
-            <a:r>
-              <a:rPr lang="en-US" dirty="0"/>
-              <a:t>Negative controls</a:t>
-            </a:r>
-          </a:p>
-        </p:txBody>
-      </p:sp>
-      <p:sp>
-        <p:nvSpPr>
-          <p:cNvPr id="3" name="Content Placeholder 2">
-            <a:extLst>
-              <a:ext uri="{FF2B5EF4-FFF2-40B4-BE49-F238E27FC236}">
-                <a16:creationId xmlns:a16="http://schemas.microsoft.com/office/drawing/2014/main" id="{B4870CA7-903B-3AEF-1795-41954B5D9CB6}"/>
-              </a:ext>
-            </a:extLst>
-          </p:cNvPr>
-          <p:cNvSpPr>
-            <a:spLocks noGrp="1"/>
-          </p:cNvSpPr>
-          <p:nvPr>
-            <p:ph idx="1"/>
-          </p:nvPr>
-        </p:nvSpPr>
-        <p:spPr/>
-        <p:txBody>
-          <a:bodyPr>
-            <a:normAutofit/>
-          </a:bodyPr>
-          <a:lstStyle/>
-          <a:p>
-            <a:pPr>
-              <a:lnSpc>
-                <a:spcPct val="115000"/>
-              </a:lnSpc>
-              <a:buFont typeface="Symbol" pitchFamily="2" charset="2"/>
-              <a:buChar char=""/>
-            </a:pPr>
-            <a:r>
-              <a:rPr lang="en-US" b="1" kern="100" dirty="0">
-                <a:effectLst/>
-                <a:latin typeface="Aptos" panose="020B0004020202020204" pitchFamily="34" charset="0"/>
-                <a:ea typeface="Aptos" panose="020B0004020202020204" pitchFamily="34" charset="0"/>
-                <a:cs typeface="Times New Roman" panose="02020603050405020304" pitchFamily="18" charset="0"/>
-              </a:rPr>
-              <a:t>What populations might be best to get negative controls from?</a:t>
-            </a:r>
-          </a:p>
-          <a:p>
-            <a:pPr lvl="1">
-              <a:lnSpc>
-                <a:spcPct val="115000"/>
-              </a:lnSpc>
-              <a:buFont typeface="Symbol" pitchFamily="2" charset="2"/>
-              <a:buChar char=""/>
-            </a:pPr>
-            <a:r>
-              <a:rPr lang="en-US" kern="100" dirty="0">
-                <a:effectLst/>
-                <a:latin typeface="Aptos" panose="020B0004020202020204" pitchFamily="34" charset="0"/>
-                <a:ea typeface="Aptos" panose="020B0004020202020204" pitchFamily="34" charset="0"/>
-                <a:cs typeface="Times New Roman" panose="02020603050405020304" pitchFamily="18" charset="0"/>
-              </a:rPr>
-              <a:t>Non-endemic area (likely to be adults)</a:t>
-            </a:r>
-          </a:p>
-          <a:p>
-            <a:pPr lvl="1">
-              <a:lnSpc>
-                <a:spcPct val="115000"/>
-              </a:lnSpc>
-              <a:buFont typeface="Symbol" pitchFamily="2" charset="2"/>
-              <a:buChar char=""/>
-            </a:pPr>
-            <a:r>
-              <a:rPr lang="en-US" kern="100" dirty="0">
-                <a:effectLst/>
-                <a:latin typeface="Aptos" panose="020B0004020202020204" pitchFamily="34" charset="0"/>
-                <a:ea typeface="Aptos" panose="020B0004020202020204" pitchFamily="34" charset="0"/>
-                <a:cs typeface="Times New Roman" panose="02020603050405020304" pitchFamily="18" charset="0"/>
-              </a:rPr>
-              <a:t>Very young presumed unexposed (likely to be from target population)</a:t>
-            </a:r>
-          </a:p>
-          <a:p>
-            <a:pPr>
-              <a:lnSpc>
-                <a:spcPct val="115000"/>
-              </a:lnSpc>
-              <a:buFont typeface="Symbol" pitchFamily="2" charset="2"/>
-              <a:buChar char=""/>
-            </a:pPr>
-            <a:endParaRPr lang="en-US" kern="100" dirty="0">
-              <a:effectLst/>
-              <a:latin typeface="Aptos" panose="020B0004020202020204" pitchFamily="34" charset="0"/>
-              <a:ea typeface="Aptos" panose="020B0004020202020204" pitchFamily="34" charset="0"/>
-              <a:cs typeface="Times New Roman" panose="02020603050405020304" pitchFamily="18" charset="0"/>
-            </a:endParaRPr>
-          </a:p>
-        </p:txBody>
-      </p:sp>
-    </p:spTree>
-    <p:extLst>
-      <p:ext uri="{BB962C8B-B14F-4D97-AF65-F5344CB8AC3E}">
-        <p14:creationId xmlns:p14="http://schemas.microsoft.com/office/powerpoint/2010/main" val="1563903188"/>
-      </p:ext>
-    </p:extLst>
-  </p:cSld>
-  <p:clrMapOvr>
-    <a:masterClrMapping/>
-  </p:clrMapOvr>
-</p:sld>
-</file>
-
-<file path=ppt/slides/slide27.xml><?xml version="1.0" encoding="utf-8"?>
-<p:sld xmlns:a="http://schemas.openxmlformats.org/drawingml/2006/main" xmlns:r="http://schemas.openxmlformats.org/officeDocument/2006/relationships" xmlns:p="http://schemas.openxmlformats.org/presentationml/2006/main">
-  <p:cSld>
-    <p:spTree>
-      <p:nvGrpSpPr>
-        <p:cNvPr id="1" name="">
-          <a:extLst>
-            <a:ext uri="{FF2B5EF4-FFF2-40B4-BE49-F238E27FC236}">
-              <a16:creationId xmlns:a16="http://schemas.microsoft.com/office/drawing/2014/main" id="{37A754C4-FF43-3212-563D-F35F1CC4EC1D}"/>
-            </a:ext>
-          </a:extLst>
-        </p:cNvPr>
-        <p:cNvGrpSpPr/>
-        <p:nvPr/>
-      </p:nvGrpSpPr>
-      <p:grpSpPr>
-        <a:xfrm>
-          <a:off x="0" y="0"/>
-          <a:ext cx="0" cy="0"/>
-          <a:chOff x="0" y="0"/>
-          <a:chExt cx="0" cy="0"/>
-        </a:xfrm>
-      </p:grpSpPr>
-      <p:sp>
-        <p:nvSpPr>
-          <p:cNvPr id="2" name="Title 1">
-            <a:extLst>
-              <a:ext uri="{FF2B5EF4-FFF2-40B4-BE49-F238E27FC236}">
-                <a16:creationId xmlns:a16="http://schemas.microsoft.com/office/drawing/2014/main" id="{BDD18FA0-69D7-C569-7D82-4A7057572ED1}"/>
-              </a:ext>
-            </a:extLst>
-          </p:cNvPr>
-          <p:cNvSpPr>
-            <a:spLocks noGrp="1"/>
-          </p:cNvSpPr>
-          <p:nvPr>
-            <p:ph type="title"/>
-          </p:nvPr>
-        </p:nvSpPr>
-        <p:spPr/>
-        <p:txBody>
-          <a:bodyPr/>
-          <a:lstStyle/>
-          <a:p>
-            <a:r>
-              <a:rPr lang="en-US" dirty="0"/>
-              <a:t>Negative controls</a:t>
-            </a:r>
-          </a:p>
-        </p:txBody>
-      </p:sp>
-      <p:sp>
-        <p:nvSpPr>
-          <p:cNvPr id="3" name="Content Placeholder 2">
-            <a:extLst>
-              <a:ext uri="{FF2B5EF4-FFF2-40B4-BE49-F238E27FC236}">
-                <a16:creationId xmlns:a16="http://schemas.microsoft.com/office/drawing/2014/main" id="{71336A5A-AA19-4D2A-8A79-4DDCE13F5EE5}"/>
-              </a:ext>
-            </a:extLst>
-          </p:cNvPr>
-          <p:cNvSpPr>
-            <a:spLocks noGrp="1"/>
-          </p:cNvSpPr>
-          <p:nvPr>
-            <p:ph idx="1"/>
-          </p:nvPr>
-        </p:nvSpPr>
-        <p:spPr/>
-        <p:txBody>
-          <a:bodyPr>
-            <a:normAutofit/>
-          </a:bodyPr>
-          <a:lstStyle/>
-          <a:p>
-            <a:pPr>
-              <a:lnSpc>
-                <a:spcPct val="115000"/>
-              </a:lnSpc>
-              <a:buFont typeface="Symbol" pitchFamily="2" charset="2"/>
-              <a:buChar char=""/>
-            </a:pPr>
-            <a:r>
-              <a:rPr lang="en-US" b="1" kern="100" dirty="0">
-                <a:effectLst/>
-                <a:latin typeface="Aptos" panose="020B0004020202020204" pitchFamily="34" charset="0"/>
-                <a:ea typeface="Aptos" panose="020B0004020202020204" pitchFamily="34" charset="0"/>
-                <a:cs typeface="Times New Roman" panose="02020603050405020304" pitchFamily="18" charset="0"/>
-              </a:rPr>
-              <a:t>What populations might be best to get negative controls from?</a:t>
-            </a:r>
-          </a:p>
-          <a:p>
-            <a:pPr lvl="1">
-              <a:lnSpc>
-                <a:spcPct val="115000"/>
-              </a:lnSpc>
-              <a:buFont typeface="Symbol" pitchFamily="2" charset="2"/>
-              <a:buChar char=""/>
-            </a:pPr>
-            <a:r>
-              <a:rPr lang="en-US" kern="100" dirty="0">
-                <a:effectLst/>
-                <a:latin typeface="Aptos" panose="020B0004020202020204" pitchFamily="34" charset="0"/>
-                <a:ea typeface="Aptos" panose="020B0004020202020204" pitchFamily="34" charset="0"/>
-                <a:cs typeface="Times New Roman" panose="02020603050405020304" pitchFamily="18" charset="0"/>
-              </a:rPr>
-              <a:t>Non-endemic area (likely to be adults)</a:t>
-            </a:r>
-          </a:p>
-          <a:p>
-            <a:pPr lvl="1">
-              <a:lnSpc>
-                <a:spcPct val="115000"/>
-              </a:lnSpc>
-              <a:buFont typeface="Symbol" pitchFamily="2" charset="2"/>
-              <a:buChar char=""/>
-            </a:pPr>
-            <a:r>
-              <a:rPr lang="en-US" kern="100" dirty="0">
-                <a:effectLst/>
-                <a:latin typeface="Aptos" panose="020B0004020202020204" pitchFamily="34" charset="0"/>
-                <a:ea typeface="Aptos" panose="020B0004020202020204" pitchFamily="34" charset="0"/>
-                <a:cs typeface="Times New Roman" panose="02020603050405020304" pitchFamily="18" charset="0"/>
-              </a:rPr>
-              <a:t>Very young presumed unexposed (likely to be from target population)</a:t>
-            </a:r>
-          </a:p>
-          <a:p>
-            <a:pPr>
-              <a:lnSpc>
-                <a:spcPct val="115000"/>
-              </a:lnSpc>
-              <a:buFont typeface="Symbol" pitchFamily="2" charset="2"/>
-              <a:buChar char=""/>
-            </a:pPr>
-            <a:r>
-              <a:rPr lang="en-US" b="1" kern="100" dirty="0">
-                <a:latin typeface="Aptos" panose="020B0004020202020204" pitchFamily="34" charset="0"/>
-                <a:ea typeface="Aptos" panose="020B0004020202020204" pitchFamily="34" charset="0"/>
-                <a:cs typeface="Times New Roman" panose="02020603050405020304" pitchFamily="18" charset="0"/>
-              </a:rPr>
-              <a:t>Why would you choose to get - or not get - controls from each of these populations?</a:t>
-            </a:r>
-            <a:endParaRPr lang="en-US" b="1" kern="100" dirty="0">
-              <a:effectLst/>
-              <a:latin typeface="Aptos" panose="020B0004020202020204" pitchFamily="34" charset="0"/>
-              <a:ea typeface="Aptos" panose="020B0004020202020204" pitchFamily="34" charset="0"/>
-              <a:cs typeface="Times New Roman" panose="02020603050405020304" pitchFamily="18" charset="0"/>
-            </a:endParaRPr>
-          </a:p>
-          <a:p>
-            <a:pPr>
-              <a:lnSpc>
-                <a:spcPct val="115000"/>
-              </a:lnSpc>
-              <a:buFont typeface="Symbol" pitchFamily="2" charset="2"/>
-              <a:buChar char=""/>
-            </a:pPr>
-            <a:endParaRPr lang="en-US" kern="100" dirty="0">
-              <a:effectLst/>
-              <a:latin typeface="Aptos" panose="020B0004020202020204" pitchFamily="34" charset="0"/>
-              <a:ea typeface="Aptos" panose="020B0004020202020204" pitchFamily="34" charset="0"/>
-              <a:cs typeface="Times New Roman" panose="02020603050405020304" pitchFamily="18" charset="0"/>
-            </a:endParaRPr>
-          </a:p>
-        </p:txBody>
-      </p:sp>
-    </p:spTree>
-    <p:extLst>
-      <p:ext uri="{BB962C8B-B14F-4D97-AF65-F5344CB8AC3E}">
-        <p14:creationId xmlns:p14="http://schemas.microsoft.com/office/powerpoint/2010/main" val="1211814404"/>
-      </p:ext>
-    </p:extLst>
-  </p:cSld>
-  <p:clrMapOvr>
-    <a:masterClrMapping/>
-  </p:clrMapOvr>
-</p:sld>
-</file>
-
-<file path=ppt/slides/slide28.xml><?xml version="1.0" encoding="utf-8"?>
-<p:sld xmlns:a="http://schemas.openxmlformats.org/drawingml/2006/main" xmlns:r="http://schemas.openxmlformats.org/officeDocument/2006/relationships" xmlns:p="http://schemas.openxmlformats.org/presentationml/2006/main">
-  <p:cSld>
-    <p:spTree>
-      <p:nvGrpSpPr>
-        <p:cNvPr id="1" name="">
-          <a:extLst>
-            <a:ext uri="{FF2B5EF4-FFF2-40B4-BE49-F238E27FC236}">
-              <a16:creationId xmlns:a16="http://schemas.microsoft.com/office/drawing/2014/main" id="{D5430584-8985-2020-66A1-A29AC931912A}"/>
-            </a:ext>
-          </a:extLst>
-        </p:cNvPr>
-        <p:cNvGrpSpPr/>
-        <p:nvPr/>
-      </p:nvGrpSpPr>
-      <p:grpSpPr>
-        <a:xfrm>
-          <a:off x="0" y="0"/>
-          <a:ext cx="0" cy="0"/>
-          <a:chOff x="0" y="0"/>
-          <a:chExt cx="0" cy="0"/>
-        </a:xfrm>
-      </p:grpSpPr>
-      <p:sp>
-        <p:nvSpPr>
-          <p:cNvPr id="2" name="Title 1">
-            <a:extLst>
-              <a:ext uri="{FF2B5EF4-FFF2-40B4-BE49-F238E27FC236}">
-                <a16:creationId xmlns:a16="http://schemas.microsoft.com/office/drawing/2014/main" id="{F44002B1-4207-947E-EA40-EF1347FE1089}"/>
-              </a:ext>
-            </a:extLst>
-          </p:cNvPr>
-          <p:cNvSpPr>
-            <a:spLocks noGrp="1"/>
-          </p:cNvSpPr>
-          <p:nvPr>
-            <p:ph type="title"/>
-          </p:nvPr>
-        </p:nvSpPr>
-        <p:spPr/>
-        <p:txBody>
-          <a:bodyPr/>
-          <a:lstStyle/>
-          <a:p>
-            <a:r>
-              <a:rPr lang="en-US" dirty="0"/>
-              <a:t>Negative controls</a:t>
-            </a:r>
-          </a:p>
-        </p:txBody>
-      </p:sp>
-      <p:sp>
-        <p:nvSpPr>
-          <p:cNvPr id="3" name="Content Placeholder 2">
-            <a:extLst>
-              <a:ext uri="{FF2B5EF4-FFF2-40B4-BE49-F238E27FC236}">
-                <a16:creationId xmlns:a16="http://schemas.microsoft.com/office/drawing/2014/main" id="{EBD1AA80-E257-4C0D-2941-6AABC4CF024C}"/>
-              </a:ext>
-            </a:extLst>
-          </p:cNvPr>
-          <p:cNvSpPr>
-            <a:spLocks noGrp="1"/>
-          </p:cNvSpPr>
-          <p:nvPr>
-            <p:ph idx="1"/>
-          </p:nvPr>
-        </p:nvSpPr>
-        <p:spPr/>
-        <p:txBody>
-          <a:bodyPr>
-            <a:normAutofit/>
-          </a:bodyPr>
-          <a:lstStyle/>
-          <a:p>
-            <a:pPr>
-              <a:lnSpc>
-                <a:spcPct val="115000"/>
-              </a:lnSpc>
-              <a:buFont typeface="Symbol" pitchFamily="2" charset="2"/>
-              <a:buChar char=""/>
-            </a:pPr>
-            <a:r>
-              <a:rPr lang="en-US" b="1" kern="100" dirty="0">
-                <a:effectLst/>
-                <a:latin typeface="Aptos" panose="020B0004020202020204" pitchFamily="34" charset="0"/>
-                <a:ea typeface="Aptos" panose="020B0004020202020204" pitchFamily="34" charset="0"/>
-                <a:cs typeface="Times New Roman" panose="02020603050405020304" pitchFamily="18" charset="0"/>
-              </a:rPr>
-              <a:t>What populations might be best to get negative controls from?</a:t>
-            </a:r>
-          </a:p>
-          <a:p>
-            <a:pPr lvl="1">
-              <a:lnSpc>
-                <a:spcPct val="115000"/>
-              </a:lnSpc>
-              <a:buFont typeface="Symbol" pitchFamily="2" charset="2"/>
-              <a:buChar char=""/>
-            </a:pPr>
-            <a:r>
-              <a:rPr lang="en-US" kern="100" dirty="0">
-                <a:effectLst/>
-                <a:latin typeface="Aptos" panose="020B0004020202020204" pitchFamily="34" charset="0"/>
-                <a:ea typeface="Aptos" panose="020B0004020202020204" pitchFamily="34" charset="0"/>
-                <a:cs typeface="Times New Roman" panose="02020603050405020304" pitchFamily="18" charset="0"/>
-              </a:rPr>
-              <a:t>Non-endemic area (likely to be adults)</a:t>
-            </a:r>
-          </a:p>
-          <a:p>
-            <a:pPr lvl="1">
-              <a:lnSpc>
-                <a:spcPct val="115000"/>
-              </a:lnSpc>
-              <a:buFont typeface="Symbol" pitchFamily="2" charset="2"/>
-              <a:buChar char=""/>
-            </a:pPr>
-            <a:r>
-              <a:rPr lang="en-US" kern="100" dirty="0">
-                <a:effectLst/>
-                <a:latin typeface="Aptos" panose="020B0004020202020204" pitchFamily="34" charset="0"/>
-                <a:ea typeface="Aptos" panose="020B0004020202020204" pitchFamily="34" charset="0"/>
-                <a:cs typeface="Times New Roman" panose="02020603050405020304" pitchFamily="18" charset="0"/>
-              </a:rPr>
-              <a:t>Very young presumed unexposed (likely to be from target population)</a:t>
-            </a:r>
-          </a:p>
-          <a:p>
-            <a:pPr>
-              <a:lnSpc>
-                <a:spcPct val="115000"/>
-              </a:lnSpc>
-              <a:buFont typeface="Symbol" pitchFamily="2" charset="2"/>
-              <a:buChar char=""/>
-            </a:pPr>
-            <a:r>
-              <a:rPr lang="en-US" b="1" kern="100" dirty="0">
-                <a:latin typeface="Aptos" panose="020B0004020202020204" pitchFamily="34" charset="0"/>
-                <a:ea typeface="Aptos" panose="020B0004020202020204" pitchFamily="34" charset="0"/>
-                <a:cs typeface="Times New Roman" panose="02020603050405020304" pitchFamily="18" charset="0"/>
-              </a:rPr>
-              <a:t>Why would you choose to get - or not get - controls from each of these populations?</a:t>
-            </a:r>
-          </a:p>
-          <a:p>
-            <a:pPr lvl="1">
-              <a:lnSpc>
-                <a:spcPct val="115000"/>
-              </a:lnSpc>
-              <a:buFont typeface="Symbol" pitchFamily="2" charset="2"/>
-              <a:buChar char=""/>
-            </a:pPr>
-            <a:r>
-              <a:rPr lang="en-US" kern="100" dirty="0">
-                <a:latin typeface="Aptos" panose="020B0004020202020204" pitchFamily="34" charset="0"/>
-                <a:ea typeface="Aptos" panose="020B0004020202020204" pitchFamily="34" charset="0"/>
-                <a:cs typeface="Times New Roman" panose="02020603050405020304" pitchFamily="18" charset="0"/>
-              </a:rPr>
-              <a:t>Controls from non-endemic area may differ from target population in many ways (geographic, socioeconomic, disease history)</a:t>
-            </a:r>
-          </a:p>
-          <a:p>
-            <a:pPr lvl="1">
-              <a:lnSpc>
-                <a:spcPct val="115000"/>
-              </a:lnSpc>
-              <a:buFont typeface="Symbol" pitchFamily="2" charset="2"/>
-              <a:buChar char=""/>
-            </a:pPr>
-            <a:r>
-              <a:rPr lang="en-US" kern="100" dirty="0">
-                <a:effectLst/>
-                <a:latin typeface="Aptos" panose="020B0004020202020204" pitchFamily="34" charset="0"/>
-                <a:ea typeface="Aptos" panose="020B0004020202020204" pitchFamily="34" charset="0"/>
-                <a:cs typeface="Times New Roman" panose="02020603050405020304" pitchFamily="18" charset="0"/>
-              </a:rPr>
-              <a:t>Very young immune systems vs. adult immune systems</a:t>
-            </a:r>
-          </a:p>
-          <a:p>
-            <a:pPr>
-              <a:lnSpc>
-                <a:spcPct val="115000"/>
-              </a:lnSpc>
-              <a:buFont typeface="Symbol" pitchFamily="2" charset="2"/>
-              <a:buChar char=""/>
-            </a:pPr>
-            <a:endParaRPr lang="en-US" kern="100" dirty="0">
-              <a:effectLst/>
-              <a:latin typeface="Aptos" panose="020B0004020202020204" pitchFamily="34" charset="0"/>
-              <a:ea typeface="Aptos" panose="020B0004020202020204" pitchFamily="34" charset="0"/>
-              <a:cs typeface="Times New Roman" panose="02020603050405020304" pitchFamily="18" charset="0"/>
-            </a:endParaRPr>
-          </a:p>
-        </p:txBody>
-      </p:sp>
-    </p:spTree>
-    <p:extLst>
-      <p:ext uri="{BB962C8B-B14F-4D97-AF65-F5344CB8AC3E}">
-        <p14:creationId xmlns:p14="http://schemas.microsoft.com/office/powerpoint/2010/main" val="3975271084"/>
-      </p:ext>
-    </p:extLst>
-  </p:cSld>
-  <p:clrMapOvr>
-    <a:masterClrMapping/>
-  </p:clrMapOvr>
-</p:sld>
-</file>
-
-<file path=ppt/slides/slide29.xml><?xml version="1.0" encoding="utf-8"?>
-<p:sld xmlns:a="http://schemas.openxmlformats.org/drawingml/2006/main" xmlns:r="http://schemas.openxmlformats.org/officeDocument/2006/relationships" xmlns:p="http://schemas.openxmlformats.org/presentationml/2006/main">
-  <p:cSld>
-    <p:spTree>
-      <p:nvGrpSpPr>
-        <p:cNvPr id="1" name=""/>
-        <p:cNvGrpSpPr/>
-        <p:nvPr/>
-      </p:nvGrpSpPr>
-      <p:grpSpPr>
-        <a:xfrm>
-          <a:off x="0" y="0"/>
-          <a:ext cx="0" cy="0"/>
-          <a:chOff x="0" y="0"/>
-          <a:chExt cx="0" cy="0"/>
-        </a:xfrm>
-      </p:grpSpPr>
-      <p:sp>
-        <p:nvSpPr>
-          <p:cNvPr id="2" name="Title 1">
-            <a:extLst>
-              <a:ext uri="{FF2B5EF4-FFF2-40B4-BE49-F238E27FC236}">
-                <a16:creationId xmlns:a16="http://schemas.microsoft.com/office/drawing/2014/main" id="{C57C8CBA-3D56-3D4D-EFC5-E6438AA4464B}"/>
-              </a:ext>
-            </a:extLst>
-          </p:cNvPr>
-          <p:cNvSpPr>
-            <a:spLocks noGrp="1"/>
-          </p:cNvSpPr>
-          <p:nvPr>
-            <p:ph type="title"/>
-          </p:nvPr>
-        </p:nvSpPr>
-        <p:spPr/>
-        <p:txBody>
-          <a:bodyPr/>
-          <a:lstStyle/>
-          <a:p>
-            <a:r>
-              <a:rPr lang="en-US" dirty="0"/>
-              <a:t>Controls</a:t>
-            </a:r>
-          </a:p>
-        </p:txBody>
-      </p:sp>
-      <p:sp>
-        <p:nvSpPr>
-          <p:cNvPr id="3" name="Content Placeholder 2">
-            <a:extLst>
-              <a:ext uri="{FF2B5EF4-FFF2-40B4-BE49-F238E27FC236}">
-                <a16:creationId xmlns:a16="http://schemas.microsoft.com/office/drawing/2014/main" id="{7BA8AEDE-9015-DCCE-B184-19C482A99E45}"/>
-              </a:ext>
-            </a:extLst>
-          </p:cNvPr>
-          <p:cNvSpPr>
-            <a:spLocks noGrp="1"/>
-          </p:cNvSpPr>
-          <p:nvPr>
-            <p:ph idx="1"/>
-          </p:nvPr>
-        </p:nvSpPr>
-        <p:spPr/>
-        <p:txBody>
-          <a:bodyPr/>
-          <a:lstStyle/>
-          <a:p>
-            <a:pPr marL="0" indent="0" algn="ctr">
-              <a:buNone/>
-            </a:pPr>
-            <a:endParaRPr lang="en-US" sz="3600" b="1" kern="100" dirty="0">
-              <a:latin typeface="Aptos" panose="020B0004020202020204" pitchFamily="34" charset="0"/>
-              <a:ea typeface="Aptos" panose="020B0004020202020204" pitchFamily="34" charset="0"/>
-              <a:cs typeface="Times New Roman" panose="02020603050405020304" pitchFamily="18" charset="0"/>
-            </a:endParaRPr>
-          </a:p>
-          <a:p>
-            <a:pPr marL="0" indent="0" algn="ctr">
-              <a:buNone/>
-            </a:pPr>
-            <a:r>
-              <a:rPr lang="en-US" sz="3600" b="1" kern="100" dirty="0">
-                <a:latin typeface="Aptos" panose="020B0004020202020204" pitchFamily="34" charset="0"/>
-                <a:ea typeface="Aptos" panose="020B0004020202020204" pitchFamily="34" charset="0"/>
-                <a:cs typeface="Times New Roman" panose="02020603050405020304" pitchFamily="18" charset="0"/>
-              </a:rPr>
-              <a:t>Y</a:t>
-            </a:r>
-            <a:r>
-              <a:rPr lang="en-US" sz="3600" b="1" kern="100" dirty="0">
-                <a:effectLst/>
-                <a:latin typeface="Aptos" panose="020B0004020202020204" pitchFamily="34" charset="0"/>
-                <a:ea typeface="Aptos" panose="020B0004020202020204" pitchFamily="34" charset="0"/>
-                <a:cs typeface="Times New Roman" panose="02020603050405020304" pitchFamily="18" charset="0"/>
-              </a:rPr>
-              <a:t>ou may not have ideal controls. </a:t>
-            </a:r>
-          </a:p>
-          <a:p>
-            <a:pPr marL="0" indent="0" algn="ctr">
-              <a:buNone/>
-            </a:pPr>
-            <a:endParaRPr lang="en-US" sz="3600" b="1" kern="100" dirty="0">
-              <a:latin typeface="Aptos" panose="020B0004020202020204" pitchFamily="34" charset="0"/>
-              <a:ea typeface="Aptos" panose="020B0004020202020204" pitchFamily="34" charset="0"/>
-              <a:cs typeface="Times New Roman" panose="02020603050405020304" pitchFamily="18" charset="0"/>
-            </a:endParaRPr>
-          </a:p>
-          <a:p>
-            <a:pPr marL="0" indent="0" algn="ctr">
-              <a:buNone/>
-            </a:pPr>
-            <a:r>
-              <a:rPr lang="en-US" sz="3600" b="1" kern="100" dirty="0">
-                <a:effectLst/>
-                <a:latin typeface="Aptos" panose="020B0004020202020204" pitchFamily="34" charset="0"/>
-                <a:ea typeface="Aptos" panose="020B0004020202020204" pitchFamily="34" charset="0"/>
-                <a:cs typeface="Times New Roman" panose="02020603050405020304" pitchFamily="18" charset="0"/>
-              </a:rPr>
-              <a:t>You should understand the assumptions/biases of your controls!</a:t>
-            </a:r>
-            <a:endParaRPr lang="en-US" sz="3600" kern="100" dirty="0">
-              <a:effectLst/>
-              <a:latin typeface="Aptos" panose="020B0004020202020204" pitchFamily="34" charset="0"/>
-              <a:ea typeface="Aptos" panose="020B0004020202020204" pitchFamily="34" charset="0"/>
-              <a:cs typeface="Times New Roman" panose="02020603050405020304" pitchFamily="18" charset="0"/>
-            </a:endParaRPr>
-          </a:p>
-          <a:p>
-            <a:endParaRPr lang="en-US" dirty="0"/>
-          </a:p>
-        </p:txBody>
-      </p:sp>
-    </p:spTree>
-    <p:extLst>
-      <p:ext uri="{BB962C8B-B14F-4D97-AF65-F5344CB8AC3E}">
-        <p14:creationId xmlns:p14="http://schemas.microsoft.com/office/powerpoint/2010/main" val="2410735319"/>
+        <p14:creationId xmlns:p14="http://schemas.microsoft.com/office/powerpoint/2010/main" val="2160286257"/>
       </p:ext>
     </p:extLst>
   </p:cSld>
@@ -10895,106 +9075,6 @@
     <p:extLst>
       <p:ext uri="{BB962C8B-B14F-4D97-AF65-F5344CB8AC3E}">
         <p14:creationId xmlns:p14="http://schemas.microsoft.com/office/powerpoint/2010/main" val="2682364400"/>
-      </p:ext>
-    </p:extLst>
-  </p:cSld>
-  <p:clrMapOvr>
-    <a:masterClrMapping/>
-  </p:clrMapOvr>
-</p:sld>
-</file>
-
-<file path=ppt/slides/slide30.xml><?xml version="1.0" encoding="utf-8"?>
-<p:sld xmlns:a="http://schemas.openxmlformats.org/drawingml/2006/main" xmlns:r="http://schemas.openxmlformats.org/officeDocument/2006/relationships" xmlns:p="http://schemas.openxmlformats.org/presentationml/2006/main">
-  <p:cSld>
-    <p:spTree>
-      <p:nvGrpSpPr>
-        <p:cNvPr id="1" name=""/>
-        <p:cNvGrpSpPr/>
-        <p:nvPr/>
-      </p:nvGrpSpPr>
-      <p:grpSpPr>
-        <a:xfrm>
-          <a:off x="0" y="0"/>
-          <a:ext cx="0" cy="0"/>
-          <a:chOff x="0" y="0"/>
-          <a:chExt cx="0" cy="0"/>
-        </a:xfrm>
-      </p:grpSpPr>
-      <p:sp>
-        <p:nvSpPr>
-          <p:cNvPr id="2" name="Title 1">
-            <a:extLst>
-              <a:ext uri="{FF2B5EF4-FFF2-40B4-BE49-F238E27FC236}">
-                <a16:creationId xmlns:a16="http://schemas.microsoft.com/office/drawing/2014/main" id="{210510F7-6FB9-CB6D-166B-B0B1018724BB}"/>
-              </a:ext>
-            </a:extLst>
-          </p:cNvPr>
-          <p:cNvSpPr>
-            <a:spLocks noGrp="1"/>
-          </p:cNvSpPr>
-          <p:nvPr>
-            <p:ph type="title"/>
-          </p:nvPr>
-        </p:nvSpPr>
-        <p:spPr/>
-        <p:txBody>
-          <a:bodyPr/>
-          <a:lstStyle/>
-          <a:p>
-            <a:r>
-              <a:rPr lang="en-US" dirty="0"/>
-              <a:t>Conclusions</a:t>
-            </a:r>
-          </a:p>
-        </p:txBody>
-      </p:sp>
-      <p:sp>
-        <p:nvSpPr>
-          <p:cNvPr id="3" name="Content Placeholder 2">
-            <a:extLst>
-              <a:ext uri="{FF2B5EF4-FFF2-40B4-BE49-F238E27FC236}">
-                <a16:creationId xmlns:a16="http://schemas.microsoft.com/office/drawing/2014/main" id="{39CCD9E5-F605-FC4F-6971-2ED435FBD898}"/>
-              </a:ext>
-            </a:extLst>
-          </p:cNvPr>
-          <p:cNvSpPr>
-            <a:spLocks noGrp="1"/>
-          </p:cNvSpPr>
-          <p:nvPr>
-            <p:ph idx="1"/>
-          </p:nvPr>
-        </p:nvSpPr>
-        <p:spPr/>
-        <p:txBody>
-          <a:bodyPr>
-            <a:normAutofit/>
-          </a:bodyPr>
-          <a:lstStyle/>
-          <a:p>
-            <a:r>
-              <a:rPr lang="en-US" sz="3000" dirty="0"/>
-              <a:t>You should visualize your data before conducting analysis.</a:t>
-            </a:r>
-          </a:p>
-          <a:p>
-            <a:r>
-              <a:rPr lang="en-US" sz="3000" dirty="0"/>
-              <a:t>It can be useful to classify samples as seropositive and seronegative, and to calculate seropositivity.</a:t>
-            </a:r>
-          </a:p>
-          <a:p>
-            <a:r>
-              <a:rPr lang="en-US" sz="3000" dirty="0"/>
-              <a:t>It’s important to understand the controls you use, and think about how these may affect your inference.</a:t>
-            </a:r>
-          </a:p>
-        </p:txBody>
-      </p:sp>
-    </p:spTree>
-    <p:extLst>
-      <p:ext uri="{BB962C8B-B14F-4D97-AF65-F5344CB8AC3E}">
-        <p14:creationId xmlns:p14="http://schemas.microsoft.com/office/powerpoint/2010/main" val="2160286257"/>
       </p:ext>
     </p:extLst>
   </p:cSld>

</xml_diff>